<commit_message>
Almost done with the poster. RIP
</commit_message>
<xml_diff>
--- a/107/poster.pptx
+++ b/107/poster.pptx
@@ -4,9 +4,12 @@
   <p:sldMasterIdLst>
     <p:sldMasterId id="2147483660" r:id="rId1"/>
   </p:sldMasterIdLst>
+  <p:notesMasterIdLst>
+    <p:notesMasterId r:id="rId4"/>
+  </p:notesMasterIdLst>
   <p:sldIdLst>
     <p:sldId id="256" r:id="rId2"/>
-    <p:sldId id="257" r:id="rId3"/>
+    <p:sldId id="258" r:id="rId3"/>
   </p:sldIdLst>
   <p:sldSz cx="9601200" cy="12801600" type="A3"/>
   <p:notesSz cx="6797675" cy="9928225"/>
@@ -421,6 +424,463 @@
 </pc:chgInfo>
 </file>
 
+<file path=ppt/notesMasters/notesMaster1.xml><?xml version="1.0" encoding="utf-8"?>
+<p:notesMaster xmlns:a="http://schemas.openxmlformats.org/drawingml/2006/main" xmlns:r="http://schemas.openxmlformats.org/officeDocument/2006/relationships" xmlns:p="http://schemas.openxmlformats.org/presentationml/2006/main">
+  <p:cSld>
+    <p:bg>
+      <p:bgRef idx="1001">
+        <a:schemeClr val="bg1"/>
+      </p:bgRef>
+    </p:bg>
+    <p:spTree>
+      <p:nvGrpSpPr>
+        <p:cNvPr id="1" name=""/>
+        <p:cNvGrpSpPr/>
+        <p:nvPr/>
+      </p:nvGrpSpPr>
+      <p:grpSpPr>
+        <a:xfrm>
+          <a:off x="0" y="0"/>
+          <a:ext cx="0" cy="0"/>
+          <a:chOff x="0" y="0"/>
+          <a:chExt cx="0" cy="0"/>
+        </a:xfrm>
+      </p:grpSpPr>
+      <p:sp>
+        <p:nvSpPr>
+          <p:cNvPr id="2" name="Header Placeholder 1"/>
+          <p:cNvSpPr>
+            <a:spLocks noGrp="1"/>
+          </p:cNvSpPr>
+          <p:nvPr>
+            <p:ph type="hdr" sz="quarter"/>
+          </p:nvPr>
+        </p:nvSpPr>
+        <p:spPr>
+          <a:xfrm>
+            <a:off x="0" y="0"/>
+            <a:ext cx="2946400" cy="498475"/>
+          </a:xfrm>
+          <a:prstGeom prst="rect">
+            <a:avLst/>
+          </a:prstGeom>
+        </p:spPr>
+        <p:txBody>
+          <a:bodyPr vert="horz" lIns="91440" tIns="45720" rIns="91440" bIns="45720" rtlCol="0"/>
+          <a:lstStyle>
+            <a:lvl1pPr algn="l">
+              <a:defRPr sz="1200"/>
+            </a:lvl1pPr>
+          </a:lstStyle>
+          <a:p>
+            <a:endParaRPr lang="en-GB"/>
+          </a:p>
+        </p:txBody>
+      </p:sp>
+      <p:sp>
+        <p:nvSpPr>
+          <p:cNvPr id="3" name="Date Placeholder 2"/>
+          <p:cNvSpPr>
+            <a:spLocks noGrp="1"/>
+          </p:cNvSpPr>
+          <p:nvPr>
+            <p:ph type="dt" idx="1"/>
+          </p:nvPr>
+        </p:nvSpPr>
+        <p:spPr>
+          <a:xfrm>
+            <a:off x="3849688" y="0"/>
+            <a:ext cx="2946400" cy="498475"/>
+          </a:xfrm>
+          <a:prstGeom prst="rect">
+            <a:avLst/>
+          </a:prstGeom>
+        </p:spPr>
+        <p:txBody>
+          <a:bodyPr vert="horz" lIns="91440" tIns="45720" rIns="91440" bIns="45720" rtlCol="0"/>
+          <a:lstStyle>
+            <a:lvl1pPr algn="r">
+              <a:defRPr sz="1200"/>
+            </a:lvl1pPr>
+          </a:lstStyle>
+          <a:p>
+            <a:fld id="{7BE97D4F-C1D4-40DB-AF54-1B4E6BEA30D8}" type="datetimeFigureOut">
+              <a:rPr lang="en-GB" smtClean="0"/>
+              <a:t>19/02/2021</a:t>
+            </a:fld>
+            <a:endParaRPr lang="en-GB"/>
+          </a:p>
+        </p:txBody>
+      </p:sp>
+      <p:sp>
+        <p:nvSpPr>
+          <p:cNvPr id="4" name="Slide Image Placeholder 3"/>
+          <p:cNvSpPr>
+            <a:spLocks noGrp="1" noRot="1" noChangeAspect="1"/>
+          </p:cNvSpPr>
+          <p:nvPr>
+            <p:ph type="sldImg" idx="2"/>
+          </p:nvPr>
+        </p:nvSpPr>
+        <p:spPr>
+          <a:xfrm>
+            <a:off x="2143125" y="1241425"/>
+            <a:ext cx="2511425" cy="3349625"/>
+          </a:xfrm>
+          <a:prstGeom prst="rect">
+            <a:avLst/>
+          </a:prstGeom>
+          <a:noFill/>
+          <a:ln w="12700">
+            <a:solidFill>
+              <a:prstClr val="black"/>
+            </a:solidFill>
+          </a:ln>
+        </p:spPr>
+        <p:txBody>
+          <a:bodyPr vert="horz" lIns="91440" tIns="45720" rIns="91440" bIns="45720" rtlCol="0" anchor="ctr"/>
+          <a:lstStyle/>
+          <a:p>
+            <a:endParaRPr lang="en-GB"/>
+          </a:p>
+        </p:txBody>
+      </p:sp>
+      <p:sp>
+        <p:nvSpPr>
+          <p:cNvPr id="5" name="Notes Placeholder 4"/>
+          <p:cNvSpPr>
+            <a:spLocks noGrp="1"/>
+          </p:cNvSpPr>
+          <p:nvPr>
+            <p:ph type="body" sz="quarter" idx="3"/>
+          </p:nvPr>
+        </p:nvSpPr>
+        <p:spPr>
+          <a:xfrm>
+            <a:off x="679450" y="4778375"/>
+            <a:ext cx="5438775" cy="3908425"/>
+          </a:xfrm>
+          <a:prstGeom prst="rect">
+            <a:avLst/>
+          </a:prstGeom>
+        </p:spPr>
+        <p:txBody>
+          <a:bodyPr vert="horz" lIns="91440" tIns="45720" rIns="91440" bIns="45720" rtlCol="0"/>
+          <a:lstStyle/>
+          <a:p>
+            <a:pPr lvl="0"/>
+            <a:r>
+              <a:rPr lang="en-US"/>
+              <a:t>Click to edit Master text styles</a:t>
+            </a:r>
+          </a:p>
+          <a:p>
+            <a:pPr lvl="1"/>
+            <a:r>
+              <a:rPr lang="en-US"/>
+              <a:t>Second level</a:t>
+            </a:r>
+          </a:p>
+          <a:p>
+            <a:pPr lvl="2"/>
+            <a:r>
+              <a:rPr lang="en-US"/>
+              <a:t>Third level</a:t>
+            </a:r>
+          </a:p>
+          <a:p>
+            <a:pPr lvl="3"/>
+            <a:r>
+              <a:rPr lang="en-US"/>
+              <a:t>Fourth level</a:t>
+            </a:r>
+          </a:p>
+          <a:p>
+            <a:pPr lvl="4"/>
+            <a:r>
+              <a:rPr lang="en-US"/>
+              <a:t>Fifth level</a:t>
+            </a:r>
+            <a:endParaRPr lang="en-GB"/>
+          </a:p>
+        </p:txBody>
+      </p:sp>
+      <p:sp>
+        <p:nvSpPr>
+          <p:cNvPr id="6" name="Footer Placeholder 5"/>
+          <p:cNvSpPr>
+            <a:spLocks noGrp="1"/>
+          </p:cNvSpPr>
+          <p:nvPr>
+            <p:ph type="ftr" sz="quarter" idx="4"/>
+          </p:nvPr>
+        </p:nvSpPr>
+        <p:spPr>
+          <a:xfrm>
+            <a:off x="0" y="9429750"/>
+            <a:ext cx="2946400" cy="498475"/>
+          </a:xfrm>
+          <a:prstGeom prst="rect">
+            <a:avLst/>
+          </a:prstGeom>
+        </p:spPr>
+        <p:txBody>
+          <a:bodyPr vert="horz" lIns="91440" tIns="45720" rIns="91440" bIns="45720" rtlCol="0" anchor="b"/>
+          <a:lstStyle>
+            <a:lvl1pPr algn="l">
+              <a:defRPr sz="1200"/>
+            </a:lvl1pPr>
+          </a:lstStyle>
+          <a:p>
+            <a:endParaRPr lang="en-GB"/>
+          </a:p>
+        </p:txBody>
+      </p:sp>
+      <p:sp>
+        <p:nvSpPr>
+          <p:cNvPr id="7" name="Slide Number Placeholder 6"/>
+          <p:cNvSpPr>
+            <a:spLocks noGrp="1"/>
+          </p:cNvSpPr>
+          <p:nvPr>
+            <p:ph type="sldNum" sz="quarter" idx="5"/>
+          </p:nvPr>
+        </p:nvSpPr>
+        <p:spPr>
+          <a:xfrm>
+            <a:off x="3849688" y="9429750"/>
+            <a:ext cx="2946400" cy="498475"/>
+          </a:xfrm>
+          <a:prstGeom prst="rect">
+            <a:avLst/>
+          </a:prstGeom>
+        </p:spPr>
+        <p:txBody>
+          <a:bodyPr vert="horz" lIns="91440" tIns="45720" rIns="91440" bIns="45720" rtlCol="0" anchor="b"/>
+          <a:lstStyle>
+            <a:lvl1pPr algn="r">
+              <a:defRPr sz="1200"/>
+            </a:lvl1pPr>
+          </a:lstStyle>
+          <a:p>
+            <a:fld id="{E4A2A986-4A11-43BF-AB4B-72BCB62C900C}" type="slidenum">
+              <a:rPr lang="en-GB" smtClean="0"/>
+              <a:t>‹#›</a:t>
+            </a:fld>
+            <a:endParaRPr lang="en-GB"/>
+          </a:p>
+        </p:txBody>
+      </p:sp>
+    </p:spTree>
+    <p:extLst>
+      <p:ext uri="{BB962C8B-B14F-4D97-AF65-F5344CB8AC3E}">
+        <p14:creationId xmlns:p14="http://schemas.microsoft.com/office/powerpoint/2010/main" val="3697091414"/>
+      </p:ext>
+    </p:extLst>
+  </p:cSld>
+  <p:clrMap bg1="lt1" tx1="dk1" bg2="lt2" tx2="dk2" accent1="accent1" accent2="accent2" accent3="accent3" accent4="accent4" accent5="accent5" accent6="accent6" hlink="hlink" folHlink="folHlink"/>
+  <p:notesStyle>
+    <a:lvl1pPr marL="0" algn="l" defTabSz="914400" rtl="0" eaLnBrk="1" latinLnBrk="0" hangingPunct="1">
+      <a:defRPr sz="1200" kern="1200">
+        <a:solidFill>
+          <a:schemeClr val="tx1"/>
+        </a:solidFill>
+        <a:latin typeface="+mn-lt"/>
+        <a:ea typeface="+mn-ea"/>
+        <a:cs typeface="+mn-cs"/>
+      </a:defRPr>
+    </a:lvl1pPr>
+    <a:lvl2pPr marL="457200" algn="l" defTabSz="914400" rtl="0" eaLnBrk="1" latinLnBrk="0" hangingPunct="1">
+      <a:defRPr sz="1200" kern="1200">
+        <a:solidFill>
+          <a:schemeClr val="tx1"/>
+        </a:solidFill>
+        <a:latin typeface="+mn-lt"/>
+        <a:ea typeface="+mn-ea"/>
+        <a:cs typeface="+mn-cs"/>
+      </a:defRPr>
+    </a:lvl2pPr>
+    <a:lvl3pPr marL="914400" algn="l" defTabSz="914400" rtl="0" eaLnBrk="1" latinLnBrk="0" hangingPunct="1">
+      <a:defRPr sz="1200" kern="1200">
+        <a:solidFill>
+          <a:schemeClr val="tx1"/>
+        </a:solidFill>
+        <a:latin typeface="+mn-lt"/>
+        <a:ea typeface="+mn-ea"/>
+        <a:cs typeface="+mn-cs"/>
+      </a:defRPr>
+    </a:lvl3pPr>
+    <a:lvl4pPr marL="1371600" algn="l" defTabSz="914400" rtl="0" eaLnBrk="1" latinLnBrk="0" hangingPunct="1">
+      <a:defRPr sz="1200" kern="1200">
+        <a:solidFill>
+          <a:schemeClr val="tx1"/>
+        </a:solidFill>
+        <a:latin typeface="+mn-lt"/>
+        <a:ea typeface="+mn-ea"/>
+        <a:cs typeface="+mn-cs"/>
+      </a:defRPr>
+    </a:lvl4pPr>
+    <a:lvl5pPr marL="1828800" algn="l" defTabSz="914400" rtl="0" eaLnBrk="1" latinLnBrk="0" hangingPunct="1">
+      <a:defRPr sz="1200" kern="1200">
+        <a:solidFill>
+          <a:schemeClr val="tx1"/>
+        </a:solidFill>
+        <a:latin typeface="+mn-lt"/>
+        <a:ea typeface="+mn-ea"/>
+        <a:cs typeface="+mn-cs"/>
+      </a:defRPr>
+    </a:lvl5pPr>
+    <a:lvl6pPr marL="2286000" algn="l" defTabSz="914400" rtl="0" eaLnBrk="1" latinLnBrk="0" hangingPunct="1">
+      <a:defRPr sz="1200" kern="1200">
+        <a:solidFill>
+          <a:schemeClr val="tx1"/>
+        </a:solidFill>
+        <a:latin typeface="+mn-lt"/>
+        <a:ea typeface="+mn-ea"/>
+        <a:cs typeface="+mn-cs"/>
+      </a:defRPr>
+    </a:lvl6pPr>
+    <a:lvl7pPr marL="2743200" algn="l" defTabSz="914400" rtl="0" eaLnBrk="1" latinLnBrk="0" hangingPunct="1">
+      <a:defRPr sz="1200" kern="1200">
+        <a:solidFill>
+          <a:schemeClr val="tx1"/>
+        </a:solidFill>
+        <a:latin typeface="+mn-lt"/>
+        <a:ea typeface="+mn-ea"/>
+        <a:cs typeface="+mn-cs"/>
+      </a:defRPr>
+    </a:lvl7pPr>
+    <a:lvl8pPr marL="3200400" algn="l" defTabSz="914400" rtl="0" eaLnBrk="1" latinLnBrk="0" hangingPunct="1">
+      <a:defRPr sz="1200" kern="1200">
+        <a:solidFill>
+          <a:schemeClr val="tx1"/>
+        </a:solidFill>
+        <a:latin typeface="+mn-lt"/>
+        <a:ea typeface="+mn-ea"/>
+        <a:cs typeface="+mn-cs"/>
+      </a:defRPr>
+    </a:lvl8pPr>
+    <a:lvl9pPr marL="3657600" algn="l" defTabSz="914400" rtl="0" eaLnBrk="1" latinLnBrk="0" hangingPunct="1">
+      <a:defRPr sz="1200" kern="1200">
+        <a:solidFill>
+          <a:schemeClr val="tx1"/>
+        </a:solidFill>
+        <a:latin typeface="+mn-lt"/>
+        <a:ea typeface="+mn-ea"/>
+        <a:cs typeface="+mn-cs"/>
+      </a:defRPr>
+    </a:lvl9pPr>
+  </p:notesStyle>
+</p:notesMaster>
+</file>
+
+<file path=ppt/notesSlides/notesSlide1.xml><?xml version="1.0" encoding="utf-8"?>
+<p:notes xmlns:a="http://schemas.openxmlformats.org/drawingml/2006/main" xmlns:r="http://schemas.openxmlformats.org/officeDocument/2006/relationships" xmlns:p="http://schemas.openxmlformats.org/presentationml/2006/main">
+  <p:cSld>
+    <p:spTree>
+      <p:nvGrpSpPr>
+        <p:cNvPr id="1" name=""/>
+        <p:cNvGrpSpPr/>
+        <p:nvPr/>
+      </p:nvGrpSpPr>
+      <p:grpSpPr>
+        <a:xfrm>
+          <a:off x="0" y="0"/>
+          <a:ext cx="0" cy="0"/>
+          <a:chOff x="0" y="0"/>
+          <a:chExt cx="0" cy="0"/>
+        </a:xfrm>
+      </p:grpSpPr>
+      <p:sp>
+        <p:nvSpPr>
+          <p:cNvPr id="2" name="Slide Image Placeholder 1"/>
+          <p:cNvSpPr>
+            <a:spLocks noGrp="1" noRot="1" noChangeAspect="1"/>
+          </p:cNvSpPr>
+          <p:nvPr>
+            <p:ph type="sldImg"/>
+          </p:nvPr>
+        </p:nvSpPr>
+        <p:spPr/>
+      </p:sp>
+      <p:sp>
+        <p:nvSpPr>
+          <p:cNvPr id="3" name="Notes Placeholder 2"/>
+          <p:cNvSpPr>
+            <a:spLocks noGrp="1"/>
+          </p:cNvSpPr>
+          <p:nvPr>
+            <p:ph type="body" idx="1"/>
+          </p:nvPr>
+        </p:nvSpPr>
+        <p:spPr/>
+        <p:txBody>
+          <a:bodyPr/>
+          <a:lstStyle/>
+          <a:p>
+            <a:r>
+              <a:rPr lang="en-GB" dirty="0"/>
+              <a:t>If the machines go down, especially on a busy day, more patients’ health will be impacted. For non-emergency scans, such as cancer MRIs, these may be pushed to a later date. With the current pandemic, this even further exacerbates the wait, and by the time the new appointment date arrives, the illness may have spread much further. This could potentially significantly decrease chances of survival, or limit the ability to perform less invasive (and therefore less risky) surgeries. </a:t>
+            </a:r>
+          </a:p>
+          <a:p>
+            <a:r>
+              <a:rPr lang="en-GB" dirty="0"/>
+              <a:t>Things to consider before a CT scan include patient pregnancy – which is something that can’t be easily changed or worked around – and certain medications. In this case, an alternative may be used – for example, a more focused MRI machine so less of the patient’s body is directly exposed, or an ultrasound. </a:t>
+            </a:r>
+          </a:p>
+          <a:p>
+            <a:r>
+              <a:rPr lang="en-GB" dirty="0"/>
+              <a:t>The radiation concern has been decreasing over time, for example newer models of machines emit less radiation (source: healthline.com). The radiation amount can also be adjusted, i.e. smaller sized patients will require less radiation to create a good image. The technician may also … Fun fact, an average </a:t>
+            </a:r>
+            <a:r>
+              <a:rPr lang="en-GB" dirty="0" err="1"/>
+              <a:t>abdomical</a:t>
+            </a:r>
+            <a:r>
+              <a:rPr lang="en-GB" dirty="0"/>
+              <a:t> CT scan emits roughly the same amount of radiation as 3 years of natural background radiation (e.g. from rocks, air, soil). </a:t>
+            </a:r>
+          </a:p>
+        </p:txBody>
+      </p:sp>
+      <p:sp>
+        <p:nvSpPr>
+          <p:cNvPr id="4" name="Slide Number Placeholder 3"/>
+          <p:cNvSpPr>
+            <a:spLocks noGrp="1"/>
+          </p:cNvSpPr>
+          <p:nvPr>
+            <p:ph type="sldNum" sz="quarter" idx="5"/>
+          </p:nvPr>
+        </p:nvSpPr>
+        <p:spPr/>
+        <p:txBody>
+          <a:bodyPr/>
+          <a:lstStyle/>
+          <a:p>
+            <a:fld id="{E4A2A986-4A11-43BF-AB4B-72BCB62C900C}" type="slidenum">
+              <a:rPr lang="en-GB" smtClean="0"/>
+              <a:t>2</a:t>
+            </a:fld>
+            <a:endParaRPr lang="en-GB"/>
+          </a:p>
+        </p:txBody>
+      </p:sp>
+    </p:spTree>
+    <p:extLst>
+      <p:ext uri="{BB962C8B-B14F-4D97-AF65-F5344CB8AC3E}">
+        <p14:creationId xmlns:p14="http://schemas.microsoft.com/office/powerpoint/2010/main" val="3032775773"/>
+      </p:ext>
+    </p:extLst>
+  </p:cSld>
+  <p:clrMapOvr>
+    <a:masterClrMapping/>
+  </p:clrMapOvr>
+</p:notes>
+</file>
+
 <file path=ppt/slideLayouts/slideLayout1.xml><?xml version="1.0" encoding="utf-8"?>
 <p:sldLayout xmlns:a="http://schemas.openxmlformats.org/drawingml/2006/main" xmlns:r="http://schemas.openxmlformats.org/officeDocument/2006/relationships" xmlns:p="http://schemas.openxmlformats.org/presentationml/2006/main" type="title" preserve="1">
   <p:cSld name="Title Slide">
@@ -3348,8 +3808,8 @@
         </p:nvSpPr>
         <p:spPr>
           <a:xfrm>
-            <a:off x="1763999" y="835335"/>
-            <a:ext cx="6073201" cy="553998"/>
+            <a:off x="502321" y="835335"/>
+            <a:ext cx="8596584" cy="523220"/>
           </a:xfrm>
           <a:prstGeom prst="rect">
             <a:avLst/>
@@ -3367,7 +3827,9 @@
               <a:rPr lang="en-US" sz="2800" b="1" dirty="0">
                 <a:ln w="13462">
                   <a:solidFill>
-                    <a:schemeClr val="bg1"/>
+                    <a:schemeClr val="bg1">
+                      <a:lumMod val="75000"/>
+                    </a:schemeClr>
                   </a:solidFill>
                   <a:prstDash val="solid"/>
                 </a:ln>
@@ -3383,51 +3845,7 @@
                   </a:outerShdw>
                 </a:effectLst>
               </a:rPr>
-              <a:t>Uses and risks, with a </a:t>
-            </a:r>
-            <a:r>
-              <a:rPr lang="en-US" sz="3000" b="1" dirty="0">
-                <a:ln w="13462">
-                  <a:solidFill>
-                    <a:schemeClr val="bg1"/>
-                  </a:solidFill>
-                  <a:prstDash val="solid"/>
-                </a:ln>
-                <a:solidFill>
-                  <a:schemeClr val="tx1">
-                    <a:lumMod val="85000"/>
-                    <a:lumOff val="15000"/>
-                  </a:schemeClr>
-                </a:solidFill>
-                <a:effectLst>
-                  <a:outerShdw dist="38100" dir="2700000" algn="bl" rotWithShape="0">
-                    <a:schemeClr val="accent5"/>
-                  </a:outerShdw>
-                </a:effectLst>
-              </a:rPr>
-              <a:t>dollop</a:t>
-            </a:r>
-            <a:r>
-              <a:rPr lang="en-US" sz="2800" b="1" dirty="0">
-                <a:ln w="13462">
-                  <a:solidFill>
-                    <a:schemeClr val="bg1"/>
-                  </a:solidFill>
-                  <a:prstDash val="solid"/>
-                </a:ln>
-                <a:solidFill>
-                  <a:schemeClr val="tx1">
-                    <a:lumMod val="85000"/>
-                    <a:lumOff val="15000"/>
-                  </a:schemeClr>
-                </a:solidFill>
-                <a:effectLst>
-                  <a:outerShdw dist="38100" dir="2700000" algn="bl" rotWithShape="0">
-                    <a:schemeClr val="accent5"/>
-                  </a:outerShdw>
-                </a:effectLst>
-              </a:rPr>
-              <a:t> of history</a:t>
+              <a:t>Very useful, but there are still some risks to be aware of!</a:t>
             </a:r>
           </a:p>
         </p:txBody>
@@ -3516,7 +3934,7 @@
         </p:nvSpPr>
         <p:spPr>
           <a:xfrm>
-            <a:off x="27701" y="9654032"/>
+            <a:off x="6749136" y="7816957"/>
             <a:ext cx="1511082" cy="523220"/>
           </a:xfrm>
           <a:prstGeom prst="rect">
@@ -3986,7 +4404,7 @@
         </p:blipFill>
         <p:spPr bwMode="auto">
           <a:xfrm>
-            <a:off x="6818216" y="7114711"/>
+            <a:off x="6881123" y="2825233"/>
             <a:ext cx="2586700" cy="1973871"/>
           </a:xfrm>
           <a:prstGeom prst="rect">
@@ -4032,7 +4450,7 @@
         <p:spPr bwMode="auto">
           <a:xfrm>
             <a:off x="4763677" y="5591153"/>
-            <a:ext cx="1934094" cy="3463638"/>
+            <a:ext cx="1934094" cy="2729002"/>
           </a:xfrm>
           <a:prstGeom prst="rect">
             <a:avLst/>
@@ -4140,13 +4558,8 @@
             </a:r>
             <a:r>
               <a:rPr lang="en-GB" sz="2500" dirty="0"/>
-              <a:t>, X-Ray tubes should be replaced every </a:t>
-            </a:r>
-            <a:r>
-              <a:rPr lang="en-GB" sz="2500"/>
-              <a:t>few years.</a:t>
-            </a:r>
-            <a:endParaRPr lang="en-GB" sz="2500" dirty="0"/>
+              <a:t>, X-Ray tubes should be replaced every few years.</a:t>
+            </a:r>
           </a:p>
         </p:txBody>
       </p:sp>
@@ -4164,7 +4577,7 @@
         </p:nvSpPr>
         <p:spPr>
           <a:xfrm>
-            <a:off x="7922903" y="6886745"/>
+            <a:off x="7922903" y="5181934"/>
             <a:ext cx="1856093" cy="307777"/>
           </a:xfrm>
           <a:prstGeom prst="rect">
@@ -4240,7 +4653,7 @@
         </p:nvSpPr>
         <p:spPr>
           <a:xfrm>
-            <a:off x="8048493" y="4645216"/>
+            <a:off x="8048493" y="4738204"/>
             <a:ext cx="1913241" cy="307777"/>
           </a:xfrm>
           <a:prstGeom prst="rect">
@@ -4310,7 +4723,7 @@
         </p:nvSpPr>
         <p:spPr>
           <a:xfrm>
-            <a:off x="3375129" y="6777083"/>
+            <a:off x="3279910" y="8171931"/>
             <a:ext cx="1432402" cy="307777"/>
           </a:xfrm>
           <a:prstGeom prst="rect">
@@ -4345,7 +4758,7 @@
         </p:nvSpPr>
         <p:spPr>
           <a:xfrm>
-            <a:off x="2135507" y="9429385"/>
+            <a:off x="6792812" y="7154590"/>
             <a:ext cx="2535811" cy="307777"/>
           </a:xfrm>
           <a:prstGeom prst="rect">
@@ -4362,6 +4775,438 @@
             <a:r>
               <a:rPr lang="en-GB" sz="1400" dirty="0"/>
               <a:t>Source: technicalprospects.com</a:t>
+            </a:r>
+          </a:p>
+        </p:txBody>
+      </p:sp>
+      <p:pic>
+        <p:nvPicPr>
+          <p:cNvPr id="10" name="Picture 9">
+            <a:extLst>
+              <a:ext uri="{FF2B5EF4-FFF2-40B4-BE49-F238E27FC236}">
+                <a16:creationId xmlns:a16="http://schemas.microsoft.com/office/drawing/2014/main" id="{016C4CC8-D673-4615-820F-3D06C9CED6B1}"/>
+              </a:ext>
+            </a:extLst>
+          </p:cNvPr>
+          <p:cNvPicPr>
+            <a:picLocks noChangeAspect="1"/>
+          </p:cNvPicPr>
+          <p:nvPr/>
+        </p:nvPicPr>
+        <p:blipFill>
+          <a:blip r:embed="rId5"/>
+          <a:stretch>
+            <a:fillRect/>
+          </a:stretch>
+        </p:blipFill>
+        <p:spPr>
+          <a:xfrm>
+            <a:off x="2150461" y="5657796"/>
+            <a:ext cx="2435419" cy="1102366"/>
+          </a:xfrm>
+          <a:prstGeom prst="rect">
+            <a:avLst/>
+          </a:prstGeom>
+        </p:spPr>
+      </p:pic>
+      <p:sp>
+        <p:nvSpPr>
+          <p:cNvPr id="33" name="TextBox 32">
+            <a:extLst>
+              <a:ext uri="{FF2B5EF4-FFF2-40B4-BE49-F238E27FC236}">
+                <a16:creationId xmlns:a16="http://schemas.microsoft.com/office/drawing/2014/main" id="{FAABC307-1E7C-4CB7-BD60-1BAB542F7338}"/>
+              </a:ext>
+            </a:extLst>
+          </p:cNvPr>
+          <p:cNvSpPr txBox="1"/>
+          <p:nvPr/>
+        </p:nvSpPr>
+        <p:spPr>
+          <a:xfrm>
+            <a:off x="2135507" y="6674540"/>
+            <a:ext cx="1360741" cy="369332"/>
+          </a:xfrm>
+          <a:prstGeom prst="rect">
+            <a:avLst/>
+          </a:prstGeom>
+          <a:noFill/>
+        </p:spPr>
+        <p:txBody>
+          <a:bodyPr wrap="square" rtlCol="0">
+            <a:spAutoFit/>
+          </a:bodyPr>
+          <a:lstStyle/>
+          <a:p>
+            <a:r>
+              <a:rPr lang="en-GB" b="1" dirty="0"/>
+              <a:t>CT machine</a:t>
+            </a:r>
+          </a:p>
+        </p:txBody>
+      </p:sp>
+      <p:sp>
+        <p:nvSpPr>
+          <p:cNvPr id="34" name="TextBox 33">
+            <a:extLst>
+              <a:ext uri="{FF2B5EF4-FFF2-40B4-BE49-F238E27FC236}">
+                <a16:creationId xmlns:a16="http://schemas.microsoft.com/office/drawing/2014/main" id="{C9E263AD-C406-460E-9CF2-80BCD3C7079D}"/>
+              </a:ext>
+            </a:extLst>
+          </p:cNvPr>
+          <p:cNvSpPr txBox="1"/>
+          <p:nvPr/>
+        </p:nvSpPr>
+        <p:spPr>
+          <a:xfrm>
+            <a:off x="3256512" y="6713465"/>
+            <a:ext cx="1913241" cy="307777"/>
+          </a:xfrm>
+          <a:prstGeom prst="rect">
+            <a:avLst/>
+          </a:prstGeom>
+          <a:noFill/>
+        </p:spPr>
+        <p:txBody>
+          <a:bodyPr wrap="square" rtlCol="0">
+            <a:spAutoFit/>
+          </a:bodyPr>
+          <a:lstStyle/>
+          <a:p>
+            <a:r>
+              <a:rPr lang="en-GB" sz="1400" dirty="0"/>
+              <a:t>Source: pdirad.com</a:t>
+            </a:r>
+          </a:p>
+        </p:txBody>
+      </p:sp>
+      <p:sp>
+        <p:nvSpPr>
+          <p:cNvPr id="35" name="TextBox 34">
+            <a:extLst>
+              <a:ext uri="{FF2B5EF4-FFF2-40B4-BE49-F238E27FC236}">
+                <a16:creationId xmlns:a16="http://schemas.microsoft.com/office/drawing/2014/main" id="{421A07FB-9689-4C2B-B051-B2B024BDD940}"/>
+              </a:ext>
+            </a:extLst>
+          </p:cNvPr>
+          <p:cNvSpPr txBox="1"/>
+          <p:nvPr/>
+        </p:nvSpPr>
+        <p:spPr>
+          <a:xfrm>
+            <a:off x="30026" y="8564850"/>
+            <a:ext cx="4638610" cy="1246495"/>
+          </a:xfrm>
+          <a:prstGeom prst="rect">
+            <a:avLst/>
+          </a:prstGeom>
+          <a:solidFill>
+            <a:schemeClr val="accent6">
+              <a:lumMod val="50000"/>
+              <a:alpha val="26000"/>
+            </a:schemeClr>
+          </a:solidFill>
+          <a:effectLst>
+            <a:softEdge rad="127000"/>
+          </a:effectLst>
+        </p:spPr>
+        <p:txBody>
+          <a:bodyPr wrap="square" rtlCol="0">
+            <a:spAutoFit/>
+          </a:bodyPr>
+          <a:lstStyle/>
+          <a:p>
+            <a:r>
+              <a:rPr lang="en-GB" sz="2500" dirty="0"/>
+              <a:t>Simulation technology may be used: research/skill practice/modelling.</a:t>
+            </a:r>
+          </a:p>
+        </p:txBody>
+      </p:sp>
+      <p:pic>
+        <p:nvPicPr>
+          <p:cNvPr id="17" name="Picture 16">
+            <a:extLst>
+              <a:ext uri="{FF2B5EF4-FFF2-40B4-BE49-F238E27FC236}">
+                <a16:creationId xmlns:a16="http://schemas.microsoft.com/office/drawing/2014/main" id="{A9067677-3934-4A39-A3F4-2FC87558651F}"/>
+              </a:ext>
+            </a:extLst>
+          </p:cNvPr>
+          <p:cNvPicPr>
+            <a:picLocks noChangeAspect="1"/>
+          </p:cNvPicPr>
+          <p:nvPr/>
+        </p:nvPicPr>
+        <p:blipFill>
+          <a:blip r:embed="rId6"/>
+          <a:stretch>
+            <a:fillRect/>
+          </a:stretch>
+        </p:blipFill>
+        <p:spPr>
+          <a:xfrm>
+            <a:off x="125635" y="9811345"/>
+            <a:ext cx="4674965" cy="2629668"/>
+          </a:xfrm>
+          <a:prstGeom prst="rect">
+            <a:avLst/>
+          </a:prstGeom>
+        </p:spPr>
+      </p:pic>
+      <p:sp>
+        <p:nvSpPr>
+          <p:cNvPr id="36" name="TextBox 35">
+            <a:extLst>
+              <a:ext uri="{FF2B5EF4-FFF2-40B4-BE49-F238E27FC236}">
+                <a16:creationId xmlns:a16="http://schemas.microsoft.com/office/drawing/2014/main" id="{4E54AE62-BB10-486C-A036-A82F1EAD6ABE}"/>
+              </a:ext>
+            </a:extLst>
+          </p:cNvPr>
+          <p:cNvSpPr txBox="1"/>
+          <p:nvPr/>
+        </p:nvSpPr>
+        <p:spPr>
+          <a:xfrm>
+            <a:off x="55176" y="12411777"/>
+            <a:ext cx="3005023" cy="369332"/>
+          </a:xfrm>
+          <a:prstGeom prst="rect">
+            <a:avLst/>
+          </a:prstGeom>
+          <a:noFill/>
+        </p:spPr>
+        <p:txBody>
+          <a:bodyPr wrap="square" rtlCol="0">
+            <a:spAutoFit/>
+          </a:bodyPr>
+          <a:lstStyle/>
+          <a:p>
+            <a:r>
+              <a:rPr lang="en-GB" b="1" dirty="0"/>
+              <a:t>Simulation of a brain surgery</a:t>
+            </a:r>
+          </a:p>
+        </p:txBody>
+      </p:sp>
+      <p:sp>
+        <p:nvSpPr>
+          <p:cNvPr id="37" name="TextBox 36">
+            <a:extLst>
+              <a:ext uri="{FF2B5EF4-FFF2-40B4-BE49-F238E27FC236}">
+                <a16:creationId xmlns:a16="http://schemas.microsoft.com/office/drawing/2014/main" id="{CECF65DF-29E8-4845-B729-9E546AFAE332}"/>
+              </a:ext>
+            </a:extLst>
+          </p:cNvPr>
+          <p:cNvSpPr txBox="1"/>
+          <p:nvPr/>
+        </p:nvSpPr>
+        <p:spPr>
+          <a:xfrm>
+            <a:off x="2906334" y="12441013"/>
+            <a:ext cx="2456080" cy="307777"/>
+          </a:xfrm>
+          <a:prstGeom prst="rect">
+            <a:avLst/>
+          </a:prstGeom>
+          <a:noFill/>
+        </p:spPr>
+        <p:txBody>
+          <a:bodyPr wrap="square" rtlCol="0">
+            <a:spAutoFit/>
+          </a:bodyPr>
+          <a:lstStyle/>
+          <a:p>
+            <a:r>
+              <a:rPr lang="en-GB" sz="1400" dirty="0"/>
+              <a:t>Source: engineering.com</a:t>
+            </a:r>
+          </a:p>
+        </p:txBody>
+      </p:sp>
+      <p:sp>
+        <p:nvSpPr>
+          <p:cNvPr id="38" name="TextBox 37">
+            <a:extLst>
+              <a:ext uri="{FF2B5EF4-FFF2-40B4-BE49-F238E27FC236}">
+                <a16:creationId xmlns:a16="http://schemas.microsoft.com/office/drawing/2014/main" id="{E035B9CF-2E9D-4259-B69C-B5A8A6735349}"/>
+              </a:ext>
+            </a:extLst>
+          </p:cNvPr>
+          <p:cNvSpPr txBox="1"/>
+          <p:nvPr/>
+        </p:nvSpPr>
+        <p:spPr>
+          <a:xfrm>
+            <a:off x="2764935" y="9214414"/>
+            <a:ext cx="1873676" cy="523220"/>
+          </a:xfrm>
+          <a:prstGeom prst="rect">
+            <a:avLst/>
+          </a:prstGeom>
+          <a:noFill/>
+        </p:spPr>
+        <p:txBody>
+          <a:bodyPr wrap="square" rtlCol="0">
+            <a:spAutoFit/>
+          </a:bodyPr>
+          <a:lstStyle/>
+          <a:p>
+            <a:r>
+              <a:rPr lang="en-GB" sz="1400" dirty="0"/>
+              <a:t>Source: elearningindustry.com</a:t>
+            </a:r>
+          </a:p>
+        </p:txBody>
+      </p:sp>
+      <p:sp>
+        <p:nvSpPr>
+          <p:cNvPr id="39" name="TextBox 38">
+            <a:extLst>
+              <a:ext uri="{FF2B5EF4-FFF2-40B4-BE49-F238E27FC236}">
+                <a16:creationId xmlns:a16="http://schemas.microsoft.com/office/drawing/2014/main" id="{A525B0D7-86D9-49FC-A5A0-A31B6FF0E34D}"/>
+              </a:ext>
+            </a:extLst>
+          </p:cNvPr>
+          <p:cNvSpPr txBox="1"/>
+          <p:nvPr/>
+        </p:nvSpPr>
+        <p:spPr>
+          <a:xfrm>
+            <a:off x="5047802" y="8398004"/>
+            <a:ext cx="4276176" cy="2015936"/>
+          </a:xfrm>
+          <a:prstGeom prst="rect">
+            <a:avLst/>
+          </a:prstGeom>
+          <a:solidFill>
+            <a:srgbClr val="E1BDD8">
+              <a:alpha val="46667"/>
+            </a:srgbClr>
+          </a:solidFill>
+          <a:effectLst>
+            <a:softEdge rad="127000"/>
+          </a:effectLst>
+        </p:spPr>
+        <p:txBody>
+          <a:bodyPr wrap="square" rtlCol="0">
+            <a:spAutoFit/>
+          </a:bodyPr>
+          <a:lstStyle/>
+          <a:p>
+            <a:r>
+              <a:rPr lang="en-GB" sz="2500" dirty="0"/>
+              <a:t>In some countries/private healthcare etc, financial information may be obtained from the patient (e.g. for insurance </a:t>
+            </a:r>
+          </a:p>
+        </p:txBody>
+      </p:sp>
+      <p:sp>
+        <p:nvSpPr>
+          <p:cNvPr id="40" name="TextBox 39">
+            <a:extLst>
+              <a:ext uri="{FF2B5EF4-FFF2-40B4-BE49-F238E27FC236}">
+                <a16:creationId xmlns:a16="http://schemas.microsoft.com/office/drawing/2014/main" id="{1546C313-AF78-430F-82D2-B4B062630529}"/>
+              </a:ext>
+            </a:extLst>
+          </p:cNvPr>
+          <p:cNvSpPr txBox="1"/>
+          <p:nvPr/>
+        </p:nvSpPr>
+        <p:spPr>
+          <a:xfrm>
+            <a:off x="7424594" y="9937853"/>
+            <a:ext cx="1914826" cy="307777"/>
+          </a:xfrm>
+          <a:prstGeom prst="rect">
+            <a:avLst/>
+          </a:prstGeom>
+          <a:noFill/>
+        </p:spPr>
+        <p:txBody>
+          <a:bodyPr wrap="square" rtlCol="0">
+            <a:spAutoFit/>
+          </a:bodyPr>
+          <a:lstStyle/>
+          <a:p>
+            <a:r>
+              <a:rPr lang="en-GB" sz="1400" dirty="0"/>
+              <a:t>Source: safensoft.com</a:t>
+            </a:r>
+          </a:p>
+        </p:txBody>
+      </p:sp>
+      <p:sp>
+        <p:nvSpPr>
+          <p:cNvPr id="41" name="TextBox 40">
+            <a:extLst>
+              <a:ext uri="{FF2B5EF4-FFF2-40B4-BE49-F238E27FC236}">
+                <a16:creationId xmlns:a16="http://schemas.microsoft.com/office/drawing/2014/main" id="{FF9B66CA-DBFF-425F-8468-708D0EDF3D33}"/>
+              </a:ext>
+            </a:extLst>
+          </p:cNvPr>
+          <p:cNvSpPr txBox="1"/>
+          <p:nvPr/>
+        </p:nvSpPr>
+        <p:spPr>
+          <a:xfrm>
+            <a:off x="5047802" y="10517369"/>
+            <a:ext cx="4276176" cy="2015936"/>
+          </a:xfrm>
+          <a:prstGeom prst="rect">
+            <a:avLst/>
+          </a:prstGeom>
+          <a:solidFill>
+            <a:srgbClr val="E5EEE0">
+              <a:alpha val="46667"/>
+            </a:srgbClr>
+          </a:solidFill>
+          <a:effectLst>
+            <a:softEdge rad="127000"/>
+          </a:effectLst>
+        </p:spPr>
+        <p:txBody>
+          <a:bodyPr wrap="square" rtlCol="0">
+            <a:spAutoFit/>
+          </a:bodyPr>
+          <a:lstStyle/>
+          <a:p>
+            <a:r>
+              <a:rPr lang="en-GB" sz="2500" dirty="0"/>
+              <a:t>Use of electronic prescriptions is becoming increasingly widespread. They are also sometimes available to the patient at home/remotely. </a:t>
+            </a:r>
+          </a:p>
+        </p:txBody>
+      </p:sp>
+      <p:sp>
+        <p:nvSpPr>
+          <p:cNvPr id="42" name="TextBox 41">
+            <a:extLst>
+              <a:ext uri="{FF2B5EF4-FFF2-40B4-BE49-F238E27FC236}">
+                <a16:creationId xmlns:a16="http://schemas.microsoft.com/office/drawing/2014/main" id="{EF37CBF4-8028-43C5-AC8E-01CB439FD631}"/>
+              </a:ext>
+            </a:extLst>
+          </p:cNvPr>
+          <p:cNvSpPr txBox="1"/>
+          <p:nvPr/>
+        </p:nvSpPr>
+        <p:spPr>
+          <a:xfrm>
+            <a:off x="8035421" y="10367794"/>
+            <a:ext cx="1432402" cy="307777"/>
+          </a:xfrm>
+          <a:prstGeom prst="rect">
+            <a:avLst/>
+          </a:prstGeom>
+          <a:noFill/>
+        </p:spPr>
+        <p:txBody>
+          <a:bodyPr wrap="square" rtlCol="0">
+            <a:spAutoFit/>
+          </a:bodyPr>
+          <a:lstStyle/>
+          <a:p>
+            <a:r>
+              <a:rPr lang="en-GB" sz="1400" dirty="0"/>
+              <a:t>Source: nhs.uk</a:t>
             </a:r>
           </a:p>
         </p:txBody>
@@ -4464,8 +5309,8 @@
         </p:nvSpPr>
         <p:spPr>
           <a:xfrm>
-            <a:off x="1763999" y="835335"/>
-            <a:ext cx="6073201" cy="553998"/>
+            <a:off x="2227661" y="835335"/>
+            <a:ext cx="5145896" cy="523220"/>
           </a:xfrm>
           <a:prstGeom prst="rect">
             <a:avLst/>
@@ -4499,940 +5344,842 @@
                   </a:outerShdw>
                 </a:effectLst>
               </a:rPr>
-              <a:t>Uses and risks, with a </a:t>
-            </a:r>
-            <a:r>
-              <a:rPr lang="en-US" sz="3000" b="1" dirty="0">
-                <a:ln w="13462">
-                  <a:solidFill>
-                    <a:schemeClr val="bg1"/>
-                  </a:solidFill>
-                  <a:prstDash val="solid"/>
-                </a:ln>
-                <a:solidFill>
-                  <a:schemeClr val="tx1">
-                    <a:lumMod val="85000"/>
-                    <a:lumOff val="15000"/>
-                  </a:schemeClr>
-                </a:solidFill>
-                <a:effectLst>
-                  <a:outerShdw dist="38100" dir="2700000" algn="bl" rotWithShape="0">
-                    <a:schemeClr val="accent5"/>
-                  </a:outerShdw>
-                </a:effectLst>
-              </a:rPr>
-              <a:t>dollop</a:t>
-            </a:r>
-            <a:r>
-              <a:rPr lang="en-US" sz="2800" b="1" dirty="0">
-                <a:ln w="13462">
-                  <a:solidFill>
-                    <a:schemeClr val="bg1"/>
-                  </a:solidFill>
-                  <a:prstDash val="solid"/>
-                </a:ln>
-                <a:solidFill>
-                  <a:schemeClr val="tx1">
-                    <a:lumMod val="85000"/>
-                    <a:lumOff val="15000"/>
-                  </a:schemeClr>
-                </a:solidFill>
-                <a:effectLst>
-                  <a:outerShdw dist="38100" dir="2700000" algn="bl" rotWithShape="0">
-                    <a:schemeClr val="accent5"/>
-                  </a:outerShdw>
-                </a:effectLst>
-              </a:rPr>
-              <a:t> of history</a:t>
-            </a:r>
-          </a:p>
-        </p:txBody>
-      </p:sp>
-      <p:sp>
-        <p:nvSpPr>
-          <p:cNvPr id="8" name="TextBox 7">
+              <a:t>More information about the risks</a:t>
+            </a:r>
+          </a:p>
+        </p:txBody>
+      </p:sp>
+      <p:grpSp>
+        <p:nvGrpSpPr>
+          <p:cNvPr id="20" name="Group 19">
             <a:extLst>
               <a:ext uri="{FF2B5EF4-FFF2-40B4-BE49-F238E27FC236}">
-                <a16:creationId xmlns:a16="http://schemas.microsoft.com/office/drawing/2014/main" id="{5B0DC79D-8C9A-4544-83A8-D449AD59AB22}"/>
+                <a16:creationId xmlns:a16="http://schemas.microsoft.com/office/drawing/2014/main" id="{17BCA26B-5603-483A-BCEB-8BF445FB7B76}"/>
               </a:ext>
             </a:extLst>
           </p:cNvPr>
-          <p:cNvSpPr txBox="1"/>
+          <p:cNvGrpSpPr/>
           <p:nvPr/>
-        </p:nvSpPr>
-        <p:spPr>
-          <a:xfrm>
-            <a:off x="261328" y="1379759"/>
-            <a:ext cx="2876362" cy="523220"/>
-          </a:xfrm>
-          <a:prstGeom prst="rect">
-            <a:avLst/>
-          </a:prstGeom>
-          <a:noFill/>
-        </p:spPr>
-        <p:txBody>
-          <a:bodyPr wrap="square" rtlCol="0">
-            <a:spAutoFit/>
-          </a:bodyPr>
-          <a:lstStyle/>
-          <a:p>
-            <a:r>
-              <a:rPr lang="en-GB" sz="2800" b="1" dirty="0"/>
-              <a:t>Medical Imaging</a:t>
-            </a:r>
-          </a:p>
-        </p:txBody>
-      </p:sp>
-      <p:sp>
-        <p:nvSpPr>
-          <p:cNvPr id="9" name="TextBox 8">
+        </p:nvGrpSpPr>
+        <p:grpSpPr>
+          <a:xfrm>
+            <a:off x="6677717" y="1529770"/>
+            <a:ext cx="2923483" cy="4204850"/>
+            <a:chOff x="6677717" y="1529770"/>
+            <a:chExt cx="2923483" cy="4204850"/>
+          </a:xfrm>
+        </p:grpSpPr>
+        <p:sp>
+          <p:nvSpPr>
+            <p:cNvPr id="9" name="TextBox 8">
+              <a:extLst>
+                <a:ext uri="{FF2B5EF4-FFF2-40B4-BE49-F238E27FC236}">
+                  <a16:creationId xmlns:a16="http://schemas.microsoft.com/office/drawing/2014/main" id="{C77BA425-2560-4BDF-A571-E80981D81F6A}"/>
+                </a:ext>
+              </a:extLst>
+            </p:cNvPr>
+            <p:cNvSpPr txBox="1"/>
+            <p:nvPr/>
+          </p:nvSpPr>
+          <p:spPr>
+            <a:xfrm>
+              <a:off x="7008495" y="1529770"/>
+              <a:ext cx="2592705" cy="523220"/>
+            </a:xfrm>
+            <a:prstGeom prst="rect">
+              <a:avLst/>
+            </a:prstGeom>
+            <a:noFill/>
+          </p:spPr>
+          <p:txBody>
+            <a:bodyPr wrap="square" rtlCol="0">
+              <a:spAutoFit/>
+            </a:bodyPr>
+            <a:lstStyle/>
+            <a:p>
+              <a:r>
+                <a:rPr lang="en-GB" sz="2800" b="1" dirty="0"/>
+                <a:t>Patient Records</a:t>
+              </a:r>
+            </a:p>
+          </p:txBody>
+        </p:sp>
+        <p:sp>
+          <p:nvSpPr>
+            <p:cNvPr id="43" name="TextBox 42">
+              <a:extLst>
+                <a:ext uri="{FF2B5EF4-FFF2-40B4-BE49-F238E27FC236}">
+                  <a16:creationId xmlns:a16="http://schemas.microsoft.com/office/drawing/2014/main" id="{986924B1-7EBC-43B4-9EB3-964A57911022}"/>
+                </a:ext>
+              </a:extLst>
+            </p:cNvPr>
+            <p:cNvSpPr txBox="1"/>
+            <p:nvPr/>
+          </p:nvSpPr>
+          <p:spPr>
+            <a:xfrm>
+              <a:off x="6677717" y="2123431"/>
+              <a:ext cx="2923483" cy="1246495"/>
+            </a:xfrm>
+            <a:prstGeom prst="rect">
+              <a:avLst/>
+            </a:prstGeom>
+            <a:solidFill>
+              <a:schemeClr val="accent1">
+                <a:lumMod val="20000"/>
+                <a:lumOff val="80000"/>
+                <a:alpha val="47000"/>
+              </a:schemeClr>
+            </a:solidFill>
+            <a:effectLst>
+              <a:softEdge rad="127000"/>
+            </a:effectLst>
+          </p:spPr>
+          <p:txBody>
+            <a:bodyPr wrap="square">
+              <a:spAutoFit/>
+            </a:bodyPr>
+            <a:lstStyle/>
+            <a:p>
+              <a:r>
+                <a:rPr lang="en-GB" sz="2500" dirty="0"/>
+                <a:t>Backup may be out of date or poorly recorded. </a:t>
+              </a:r>
+            </a:p>
+          </p:txBody>
+        </p:sp>
+        <p:sp>
+          <p:nvSpPr>
+            <p:cNvPr id="44" name="TextBox 43">
+              <a:extLst>
+                <a:ext uri="{FF2B5EF4-FFF2-40B4-BE49-F238E27FC236}">
+                  <a16:creationId xmlns:a16="http://schemas.microsoft.com/office/drawing/2014/main" id="{E8CE06E6-E690-4C79-BBFC-DF18E0A39C98}"/>
+                </a:ext>
+              </a:extLst>
+            </p:cNvPr>
+            <p:cNvSpPr txBox="1"/>
+            <p:nvPr/>
+          </p:nvSpPr>
+          <p:spPr>
+            <a:xfrm>
+              <a:off x="6684838" y="3718684"/>
+              <a:ext cx="2782985" cy="2015936"/>
+            </a:xfrm>
+            <a:prstGeom prst="rect">
+              <a:avLst/>
+            </a:prstGeom>
+            <a:solidFill>
+              <a:schemeClr val="accent1">
+                <a:lumMod val="20000"/>
+                <a:lumOff val="80000"/>
+                <a:alpha val="47000"/>
+              </a:schemeClr>
+            </a:solidFill>
+            <a:effectLst>
+              <a:softEdge rad="127000"/>
+            </a:effectLst>
+          </p:spPr>
+          <p:txBody>
+            <a:bodyPr wrap="square" rtlCol="0">
+              <a:spAutoFit/>
+            </a:bodyPr>
+            <a:lstStyle/>
+            <a:p>
+              <a:r>
+                <a:rPr lang="en-GB" sz="2500" dirty="0"/>
+                <a:t>Patient/their families may miss things out since they are under stress</a:t>
+              </a:r>
+            </a:p>
+          </p:txBody>
+        </p:sp>
+      </p:grpSp>
+      <p:grpSp>
+        <p:nvGrpSpPr>
+          <p:cNvPr id="24" name="Group 23">
             <a:extLst>
               <a:ext uri="{FF2B5EF4-FFF2-40B4-BE49-F238E27FC236}">
-                <a16:creationId xmlns:a16="http://schemas.microsoft.com/office/drawing/2014/main" id="{C77BA425-2560-4BDF-A571-E80981D81F6A}"/>
+                <a16:creationId xmlns:a16="http://schemas.microsoft.com/office/drawing/2014/main" id="{9F0520A8-AD86-4332-AA67-F58F4DE9A87D}"/>
               </a:ext>
             </a:extLst>
           </p:cNvPr>
-          <p:cNvSpPr txBox="1"/>
+          <p:cNvGrpSpPr/>
           <p:nvPr/>
-        </p:nvSpPr>
-        <p:spPr>
-          <a:xfrm>
-            <a:off x="7008495" y="1251453"/>
-            <a:ext cx="2592705" cy="523220"/>
-          </a:xfrm>
-          <a:prstGeom prst="rect">
-            <a:avLst/>
-          </a:prstGeom>
-          <a:noFill/>
-        </p:spPr>
-        <p:txBody>
-          <a:bodyPr wrap="square" rtlCol="0">
-            <a:spAutoFit/>
-          </a:bodyPr>
-          <a:lstStyle/>
-          <a:p>
-            <a:r>
-              <a:rPr lang="en-GB" sz="2800" b="1" dirty="0"/>
-              <a:t>Patient Records</a:t>
-            </a:r>
-          </a:p>
-        </p:txBody>
-      </p:sp>
-      <p:sp>
-        <p:nvSpPr>
-          <p:cNvPr id="11" name="TextBox 10">
+        </p:nvGrpSpPr>
+        <p:grpSpPr>
+          <a:xfrm>
+            <a:off x="161989" y="1718247"/>
+            <a:ext cx="4638610" cy="5669783"/>
+            <a:chOff x="161989" y="1718247"/>
+            <a:chExt cx="4638610" cy="5669783"/>
+          </a:xfrm>
+        </p:grpSpPr>
+        <p:sp>
+          <p:nvSpPr>
+            <p:cNvPr id="45" name="TextBox 44">
+              <a:extLst>
+                <a:ext uri="{FF2B5EF4-FFF2-40B4-BE49-F238E27FC236}">
+                  <a16:creationId xmlns:a16="http://schemas.microsoft.com/office/drawing/2014/main" id="{D4E00BEF-158B-4CC1-990C-D9FC5653214D}"/>
+                </a:ext>
+              </a:extLst>
+            </p:cNvPr>
+            <p:cNvSpPr txBox="1"/>
+            <p:nvPr/>
+          </p:nvSpPr>
+          <p:spPr>
+            <a:xfrm>
+              <a:off x="161989" y="2204177"/>
+              <a:ext cx="4638610" cy="3170099"/>
+            </a:xfrm>
+            <a:prstGeom prst="rect">
+              <a:avLst/>
+            </a:prstGeom>
+            <a:solidFill>
+              <a:schemeClr val="tx2">
+                <a:lumMod val="60000"/>
+                <a:lumOff val="40000"/>
+                <a:alpha val="26000"/>
+              </a:schemeClr>
+            </a:solidFill>
+            <a:effectLst>
+              <a:softEdge rad="127000"/>
+            </a:effectLst>
+          </p:spPr>
+          <p:txBody>
+            <a:bodyPr wrap="square" rtlCol="0">
+              <a:spAutoFit/>
+            </a:bodyPr>
+            <a:lstStyle/>
+            <a:p>
+              <a:r>
+                <a:rPr lang="en-GB" sz="2500" dirty="0"/>
+                <a:t>Could be an extra cost for the establishment. May fail unexpectedly, in which case other patients may also be affected since the remaining machines will have to compensate. Delays may cause health to deteriorate further.</a:t>
+              </a:r>
+            </a:p>
+          </p:txBody>
+        </p:sp>
+        <p:sp>
+          <p:nvSpPr>
+            <p:cNvPr id="47" name="TextBox 46">
+              <a:extLst>
+                <a:ext uri="{FF2B5EF4-FFF2-40B4-BE49-F238E27FC236}">
+                  <a16:creationId xmlns:a16="http://schemas.microsoft.com/office/drawing/2014/main" id="{81A86ADE-F39A-4538-B822-6F6D94B5896E}"/>
+                </a:ext>
+              </a:extLst>
+            </p:cNvPr>
+            <p:cNvSpPr txBox="1"/>
+            <p:nvPr/>
+          </p:nvSpPr>
+          <p:spPr>
+            <a:xfrm>
+              <a:off x="161989" y="5372094"/>
+              <a:ext cx="4638610" cy="2015936"/>
+            </a:xfrm>
+            <a:prstGeom prst="rect">
+              <a:avLst/>
+            </a:prstGeom>
+            <a:solidFill>
+              <a:schemeClr val="tx2">
+                <a:lumMod val="60000"/>
+                <a:lumOff val="40000"/>
+                <a:alpha val="26000"/>
+              </a:schemeClr>
+            </a:solidFill>
+            <a:effectLst>
+              <a:softEdge rad="127000"/>
+            </a:effectLst>
+          </p:spPr>
+          <p:txBody>
+            <a:bodyPr wrap="square" rtlCol="0">
+              <a:spAutoFit/>
+            </a:bodyPr>
+            <a:lstStyle/>
+            <a:p>
+              <a:r>
+                <a:rPr lang="en-GB" sz="2500" dirty="0"/>
+                <a:t>CT relies on radiation – there are precautions in place, but there is still a (small) possibility of there still being some risk, particularly in the event of a malfunction.</a:t>
+              </a:r>
+            </a:p>
+          </p:txBody>
+        </p:sp>
+        <p:sp>
+          <p:nvSpPr>
+            <p:cNvPr id="48" name="TextBox 47">
+              <a:extLst>
+                <a:ext uri="{FF2B5EF4-FFF2-40B4-BE49-F238E27FC236}">
+                  <a16:creationId xmlns:a16="http://schemas.microsoft.com/office/drawing/2014/main" id="{C1729F55-2D11-4C32-AFF8-BAC8957D37A6}"/>
+                </a:ext>
+              </a:extLst>
+            </p:cNvPr>
+            <p:cNvSpPr txBox="1"/>
+            <p:nvPr/>
+          </p:nvSpPr>
+          <p:spPr>
+            <a:xfrm>
+              <a:off x="320976" y="1718247"/>
+              <a:ext cx="2876362" cy="523220"/>
+            </a:xfrm>
+            <a:prstGeom prst="rect">
+              <a:avLst/>
+            </a:prstGeom>
+            <a:noFill/>
+          </p:spPr>
+          <p:txBody>
+            <a:bodyPr wrap="square" rtlCol="0">
+              <a:spAutoFit/>
+            </a:bodyPr>
+            <a:lstStyle/>
+            <a:p>
+              <a:r>
+                <a:rPr lang="en-GB" sz="2800" b="1" dirty="0"/>
+                <a:t>Medical Imaging</a:t>
+              </a:r>
+            </a:p>
+          </p:txBody>
+        </p:sp>
+      </p:grpSp>
+      <p:grpSp>
+        <p:nvGrpSpPr>
+          <p:cNvPr id="22" name="Group 21">
             <a:extLst>
               <a:ext uri="{FF2B5EF4-FFF2-40B4-BE49-F238E27FC236}">
-                <a16:creationId xmlns:a16="http://schemas.microsoft.com/office/drawing/2014/main" id="{9FE23499-90CF-4AAD-937B-03497A3E52FD}"/>
+                <a16:creationId xmlns:a16="http://schemas.microsoft.com/office/drawing/2014/main" id="{5898F415-2DF3-4BFD-B655-249E91ADBDF1}"/>
               </a:ext>
             </a:extLst>
           </p:cNvPr>
-          <p:cNvSpPr txBox="1"/>
+          <p:cNvGrpSpPr/>
           <p:nvPr/>
-        </p:nvSpPr>
-        <p:spPr>
-          <a:xfrm>
-            <a:off x="27701" y="9654032"/>
-            <a:ext cx="1511082" cy="523220"/>
-          </a:xfrm>
-          <a:prstGeom prst="rect">
-            <a:avLst/>
-          </a:prstGeom>
-          <a:noFill/>
-        </p:spPr>
-        <p:txBody>
-          <a:bodyPr wrap="square" rtlCol="0">
-            <a:spAutoFit/>
-          </a:bodyPr>
-          <a:lstStyle/>
-          <a:p>
-            <a:r>
-              <a:rPr lang="en-GB" sz="2800" b="1" dirty="0"/>
-              <a:t>Security</a:t>
-            </a:r>
-          </a:p>
-        </p:txBody>
-      </p:sp>
-      <p:sp>
-        <p:nvSpPr>
-          <p:cNvPr id="2" name="TextBox 1">
+        </p:nvGrpSpPr>
+        <p:grpSpPr>
+          <a:xfrm>
+            <a:off x="147434" y="7862124"/>
+            <a:ext cx="4638610" cy="2539156"/>
+            <a:chOff x="147434" y="7862124"/>
+            <a:chExt cx="4638610" cy="2539156"/>
+          </a:xfrm>
+        </p:grpSpPr>
+        <p:sp>
+          <p:nvSpPr>
+            <p:cNvPr id="46" name="TextBox 45">
+              <a:extLst>
+                <a:ext uri="{FF2B5EF4-FFF2-40B4-BE49-F238E27FC236}">
+                  <a16:creationId xmlns:a16="http://schemas.microsoft.com/office/drawing/2014/main" id="{786FD0EC-5404-48B1-8985-A42A29B3A1FF}"/>
+                </a:ext>
+              </a:extLst>
+            </p:cNvPr>
+            <p:cNvSpPr txBox="1"/>
+            <p:nvPr/>
+          </p:nvSpPr>
+          <p:spPr>
+            <a:xfrm>
+              <a:off x="147434" y="8385344"/>
+              <a:ext cx="4638610" cy="2015936"/>
+            </a:xfrm>
+            <a:prstGeom prst="rect">
+              <a:avLst/>
+            </a:prstGeom>
+            <a:solidFill>
+              <a:schemeClr val="accent6">
+                <a:lumMod val="50000"/>
+                <a:alpha val="26000"/>
+              </a:schemeClr>
+            </a:solidFill>
+            <a:effectLst>
+              <a:softEdge rad="127000"/>
+            </a:effectLst>
+          </p:spPr>
+          <p:txBody>
+            <a:bodyPr wrap="square" rtlCol="0">
+              <a:spAutoFit/>
+            </a:bodyPr>
+            <a:lstStyle/>
+            <a:p>
+              <a:r>
+                <a:rPr lang="en-GB" sz="2500" dirty="0"/>
+                <a:t>This can be used to assist teaching interns, and to practice long surgeries on a ‘living’ structure before trying it on the actual patient. </a:t>
+              </a:r>
+            </a:p>
+          </p:txBody>
+        </p:sp>
+        <p:sp>
+          <p:nvSpPr>
+            <p:cNvPr id="49" name="TextBox 48">
+              <a:extLst>
+                <a:ext uri="{FF2B5EF4-FFF2-40B4-BE49-F238E27FC236}">
+                  <a16:creationId xmlns:a16="http://schemas.microsoft.com/office/drawing/2014/main" id="{51AA6D6D-A804-471F-88F7-54A22B453C05}"/>
+                </a:ext>
+              </a:extLst>
+            </p:cNvPr>
+            <p:cNvSpPr txBox="1"/>
+            <p:nvPr/>
+          </p:nvSpPr>
+          <p:spPr>
+            <a:xfrm>
+              <a:off x="248074" y="7862124"/>
+              <a:ext cx="2417633" cy="523220"/>
+            </a:xfrm>
+            <a:prstGeom prst="rect">
+              <a:avLst/>
+            </a:prstGeom>
+            <a:noFill/>
+          </p:spPr>
+          <p:txBody>
+            <a:bodyPr wrap="square" rtlCol="0">
+              <a:spAutoFit/>
+            </a:bodyPr>
+            <a:lstStyle/>
+            <a:p>
+              <a:r>
+                <a:rPr lang="en-GB" sz="2800" b="1" dirty="0"/>
+                <a:t>Simulation</a:t>
+              </a:r>
+            </a:p>
+          </p:txBody>
+        </p:sp>
+      </p:grpSp>
+      <p:grpSp>
+        <p:nvGrpSpPr>
+          <p:cNvPr id="21" name="Group 20">
             <a:extLst>
               <a:ext uri="{FF2B5EF4-FFF2-40B4-BE49-F238E27FC236}">
-                <a16:creationId xmlns:a16="http://schemas.microsoft.com/office/drawing/2014/main" id="{3EC3F8BC-507A-431D-B642-8147C11226CE}"/>
+                <a16:creationId xmlns:a16="http://schemas.microsoft.com/office/drawing/2014/main" id="{A313C645-3E47-4CCF-A5EE-23BADC35DEAB}"/>
               </a:ext>
             </a:extLst>
           </p:cNvPr>
-          <p:cNvSpPr txBox="1"/>
+          <p:cNvGrpSpPr/>
           <p:nvPr/>
-        </p:nvSpPr>
-        <p:spPr>
-          <a:xfrm>
-            <a:off x="291355" y="1806008"/>
-            <a:ext cx="2909039" cy="1923604"/>
-          </a:xfrm>
-          <a:prstGeom prst="rect">
-            <a:avLst/>
-          </a:prstGeom>
-          <a:solidFill>
-            <a:schemeClr val="accent6">
-              <a:lumMod val="40000"/>
-              <a:lumOff val="60000"/>
-              <a:alpha val="34000"/>
-            </a:schemeClr>
-          </a:solidFill>
-          <a:effectLst>
-            <a:softEdge rad="127000"/>
-          </a:effectLst>
-        </p:spPr>
-        <p:txBody>
-          <a:bodyPr wrap="square" lIns="0" tIns="0" rIns="0" bIns="0" rtlCol="0">
-            <a:spAutoFit/>
-          </a:bodyPr>
-          <a:lstStyle/>
-          <a:p>
-            <a:r>
-              <a:rPr lang="en-GB" sz="2500" b="1" dirty="0"/>
-              <a:t>X-Rays: </a:t>
-            </a:r>
-            <a:r>
-              <a:rPr lang="en-GB" sz="2500" dirty="0"/>
-              <a:t>Bone structure scans. Takes around 10-15 minutes; results in 10 minutes.</a:t>
-            </a:r>
-          </a:p>
-        </p:txBody>
-      </p:sp>
-      <p:sp>
-        <p:nvSpPr>
-          <p:cNvPr id="12" name="TextBox 11">
-            <a:extLst>
-              <a:ext uri="{FF2B5EF4-FFF2-40B4-BE49-F238E27FC236}">
-                <a16:creationId xmlns:a16="http://schemas.microsoft.com/office/drawing/2014/main" id="{BBB123FE-8541-4735-8E92-ED75049B8A75}"/>
-              </a:ext>
-            </a:extLst>
-          </p:cNvPr>
-          <p:cNvSpPr txBox="1"/>
-          <p:nvPr/>
-        </p:nvSpPr>
-        <p:spPr>
-          <a:xfrm>
-            <a:off x="2052377" y="3708927"/>
-            <a:ext cx="2711299" cy="2015936"/>
-          </a:xfrm>
-          <a:prstGeom prst="rect">
-            <a:avLst/>
-          </a:prstGeom>
-          <a:solidFill>
-            <a:schemeClr val="accent4">
-              <a:lumMod val="40000"/>
-              <a:lumOff val="60000"/>
-              <a:alpha val="30000"/>
-            </a:schemeClr>
-          </a:solidFill>
-          <a:effectLst>
-            <a:softEdge rad="127000"/>
-          </a:effectLst>
-        </p:spPr>
-        <p:txBody>
-          <a:bodyPr wrap="square" rtlCol="0">
-            <a:spAutoFit/>
-          </a:bodyPr>
-          <a:lstStyle/>
-          <a:p>
-            <a:r>
-              <a:rPr lang="en-GB" sz="2500" b="1" dirty="0"/>
-              <a:t>CT:</a:t>
-            </a:r>
-            <a:r>
-              <a:rPr lang="en-GB" sz="2500" dirty="0"/>
-              <a:t> Shows internal structures. </a:t>
-            </a:r>
-          </a:p>
-          <a:p>
-            <a:r>
-              <a:rPr lang="en-GB" sz="2500" dirty="0"/>
-              <a:t>Diagnoses blood flow problems, cancer, stroke</a:t>
-            </a:r>
-          </a:p>
-        </p:txBody>
-      </p:sp>
-      <p:pic>
-        <p:nvPicPr>
-          <p:cNvPr id="3" name="Picture 2">
-            <a:extLst>
-              <a:ext uri="{FF2B5EF4-FFF2-40B4-BE49-F238E27FC236}">
-                <a16:creationId xmlns:a16="http://schemas.microsoft.com/office/drawing/2014/main" id="{0ABEFB01-7C70-4116-AC3B-F4B1559A6BB6}"/>
-              </a:ext>
-            </a:extLst>
-          </p:cNvPr>
-          <p:cNvPicPr>
-            <a:picLocks noChangeAspect="1"/>
-          </p:cNvPicPr>
-          <p:nvPr/>
-        </p:nvPicPr>
-        <p:blipFill rotWithShape="1">
-          <a:blip r:embed="rId2"/>
-          <a:srcRect l="4051" r="50371"/>
-          <a:stretch/>
-        </p:blipFill>
-        <p:spPr>
-          <a:xfrm>
-            <a:off x="125635" y="3847477"/>
-            <a:ext cx="1870373" cy="2308325"/>
-          </a:xfrm>
-          <a:prstGeom prst="rect">
-            <a:avLst/>
-          </a:prstGeom>
-        </p:spPr>
-      </p:pic>
-      <p:sp>
-        <p:nvSpPr>
-          <p:cNvPr id="6" name="TextBox 5">
-            <a:extLst>
-              <a:ext uri="{FF2B5EF4-FFF2-40B4-BE49-F238E27FC236}">
-                <a16:creationId xmlns:a16="http://schemas.microsoft.com/office/drawing/2014/main" id="{7FD23872-216A-4657-9106-01080ECD103E}"/>
-              </a:ext>
-            </a:extLst>
-          </p:cNvPr>
-          <p:cNvSpPr txBox="1"/>
-          <p:nvPr/>
-        </p:nvSpPr>
-        <p:spPr>
-          <a:xfrm>
-            <a:off x="265561" y="3578843"/>
-            <a:ext cx="2025971" cy="307777"/>
-          </a:xfrm>
-          <a:prstGeom prst="rect">
-            <a:avLst/>
-          </a:prstGeom>
-          <a:noFill/>
-        </p:spPr>
-        <p:txBody>
-          <a:bodyPr wrap="square" rtlCol="0">
-            <a:spAutoFit/>
-          </a:bodyPr>
-          <a:lstStyle/>
-          <a:p>
-            <a:r>
-              <a:rPr lang="en-GB" sz="1400" dirty="0"/>
-              <a:t>Source: bbc.co.uk</a:t>
-            </a:r>
-          </a:p>
-        </p:txBody>
-      </p:sp>
-      <p:sp>
-        <p:nvSpPr>
-          <p:cNvPr id="13" name="TextBox 12">
-            <a:extLst>
-              <a:ext uri="{FF2B5EF4-FFF2-40B4-BE49-F238E27FC236}">
-                <a16:creationId xmlns:a16="http://schemas.microsoft.com/office/drawing/2014/main" id="{FBD3DDDC-235E-45FC-BA58-6E1877C1AC20}"/>
-              </a:ext>
-            </a:extLst>
-          </p:cNvPr>
-          <p:cNvSpPr txBox="1"/>
-          <p:nvPr/>
-        </p:nvSpPr>
-        <p:spPr>
-          <a:xfrm>
-            <a:off x="85451" y="6113831"/>
-            <a:ext cx="2062961" cy="646331"/>
-          </a:xfrm>
-          <a:prstGeom prst="rect">
-            <a:avLst/>
-          </a:prstGeom>
-          <a:noFill/>
-        </p:spPr>
-        <p:txBody>
-          <a:bodyPr wrap="square" rtlCol="0">
-            <a:spAutoFit/>
-          </a:bodyPr>
-          <a:lstStyle/>
-          <a:p>
-            <a:r>
-              <a:rPr lang="en-GB" b="1" dirty="0"/>
-              <a:t>Orange represents a brain tumour</a:t>
-            </a:r>
-            <a:endParaRPr lang="en-GB" dirty="0"/>
-          </a:p>
-        </p:txBody>
-      </p:sp>
-      <p:pic>
-        <p:nvPicPr>
-          <p:cNvPr id="7" name="Picture 6">
-            <a:extLst>
-              <a:ext uri="{FF2B5EF4-FFF2-40B4-BE49-F238E27FC236}">
-                <a16:creationId xmlns:a16="http://schemas.microsoft.com/office/drawing/2014/main" id="{FA3FE9AE-7324-4977-8662-3999E84B7EC8}"/>
-              </a:ext>
-            </a:extLst>
-          </p:cNvPr>
-          <p:cNvPicPr>
-            <a:picLocks noChangeAspect="1"/>
-          </p:cNvPicPr>
-          <p:nvPr/>
-        </p:nvPicPr>
-        <p:blipFill>
-          <a:blip r:embed="rId3"/>
-          <a:stretch>
-            <a:fillRect/>
-          </a:stretch>
-        </p:blipFill>
-        <p:spPr>
-          <a:xfrm>
-            <a:off x="3250817" y="1388500"/>
-            <a:ext cx="1387794" cy="1340838"/>
-          </a:xfrm>
-          <a:prstGeom prst="rect">
-            <a:avLst/>
-          </a:prstGeom>
-        </p:spPr>
-      </p:pic>
-      <p:pic>
-        <p:nvPicPr>
-          <p:cNvPr id="14" name="Picture 13">
-            <a:extLst>
-              <a:ext uri="{FF2B5EF4-FFF2-40B4-BE49-F238E27FC236}">
-                <a16:creationId xmlns:a16="http://schemas.microsoft.com/office/drawing/2014/main" id="{01B4DC9E-4666-4927-B3F5-4A6B21A3B5A2}"/>
-              </a:ext>
-            </a:extLst>
-          </p:cNvPr>
-          <p:cNvPicPr>
-            <a:picLocks noChangeAspect="1"/>
-          </p:cNvPicPr>
-          <p:nvPr/>
-        </p:nvPicPr>
-        <p:blipFill rotWithShape="1">
-          <a:blip r:embed="rId3"/>
-          <a:srcRect l="53325" t="32162" r="27462" b="45447"/>
-          <a:stretch/>
-        </p:blipFill>
-        <p:spPr>
-          <a:xfrm>
-            <a:off x="4763677" y="1388500"/>
-            <a:ext cx="1870363" cy="2105892"/>
-          </a:xfrm>
-          <a:prstGeom prst="rect">
-            <a:avLst/>
-          </a:prstGeom>
-        </p:spPr>
-      </p:pic>
-      <p:sp>
-        <p:nvSpPr>
-          <p:cNvPr id="15" name="TextBox 14">
-            <a:extLst>
-              <a:ext uri="{FF2B5EF4-FFF2-40B4-BE49-F238E27FC236}">
-                <a16:creationId xmlns:a16="http://schemas.microsoft.com/office/drawing/2014/main" id="{FE0E6BF0-8172-4119-8BAC-F225C2E6E688}"/>
-              </a:ext>
-            </a:extLst>
-          </p:cNvPr>
-          <p:cNvSpPr txBox="1"/>
-          <p:nvPr/>
-        </p:nvSpPr>
-        <p:spPr>
-          <a:xfrm>
-            <a:off x="3200394" y="2679135"/>
-            <a:ext cx="1387795" cy="738664"/>
-          </a:xfrm>
-          <a:prstGeom prst="rect">
-            <a:avLst/>
-          </a:prstGeom>
-          <a:noFill/>
-        </p:spPr>
-        <p:txBody>
-          <a:bodyPr wrap="square" rtlCol="0">
-            <a:spAutoFit/>
-          </a:bodyPr>
-          <a:lstStyle/>
-          <a:p>
-            <a:pPr algn="r"/>
-            <a:r>
-              <a:rPr lang="en-GB" sz="1400" dirty="0"/>
-              <a:t>Source: alexanderorthopaedics.com</a:t>
-            </a:r>
-          </a:p>
-        </p:txBody>
-      </p:sp>
-      <p:sp>
-        <p:nvSpPr>
-          <p:cNvPr id="16" name="TextBox 15">
-            <a:extLst>
-              <a:ext uri="{FF2B5EF4-FFF2-40B4-BE49-F238E27FC236}">
-                <a16:creationId xmlns:a16="http://schemas.microsoft.com/office/drawing/2014/main" id="{BF098CD8-F002-49B7-94F1-5031660D94D8}"/>
-              </a:ext>
-            </a:extLst>
-          </p:cNvPr>
-          <p:cNvSpPr txBox="1"/>
-          <p:nvPr/>
-        </p:nvSpPr>
-        <p:spPr>
-          <a:xfrm>
-            <a:off x="3250816" y="3486094"/>
-            <a:ext cx="3383223" cy="369332"/>
-          </a:xfrm>
-          <a:prstGeom prst="rect">
-            <a:avLst/>
-          </a:prstGeom>
-          <a:noFill/>
-        </p:spPr>
-        <p:txBody>
-          <a:bodyPr wrap="square" rtlCol="0">
-            <a:spAutoFit/>
-          </a:bodyPr>
-          <a:lstStyle/>
-          <a:p>
-            <a:r>
-              <a:rPr lang="en-GB" b="1" dirty="0"/>
-              <a:t>Zoomed image shows a rib break. </a:t>
-            </a:r>
-          </a:p>
-        </p:txBody>
-      </p:sp>
-      <p:sp>
-        <p:nvSpPr>
-          <p:cNvPr id="18" name="TextBox 17">
-            <a:extLst>
-              <a:ext uri="{FF2B5EF4-FFF2-40B4-BE49-F238E27FC236}">
-                <a16:creationId xmlns:a16="http://schemas.microsoft.com/office/drawing/2014/main" id="{27459428-D0FC-4E4B-8C63-329878D8AA79}"/>
-              </a:ext>
-            </a:extLst>
-          </p:cNvPr>
-          <p:cNvSpPr txBox="1"/>
-          <p:nvPr/>
-        </p:nvSpPr>
-        <p:spPr>
-          <a:xfrm>
-            <a:off x="6995184" y="1681521"/>
-            <a:ext cx="2592706" cy="1154162"/>
-          </a:xfrm>
-          <a:prstGeom prst="rect">
-            <a:avLst/>
-          </a:prstGeom>
-          <a:solidFill>
-            <a:schemeClr val="accent2">
-              <a:lumMod val="40000"/>
-              <a:lumOff val="60000"/>
-              <a:alpha val="20000"/>
-            </a:schemeClr>
-          </a:solidFill>
-          <a:effectLst>
-            <a:softEdge rad="127000"/>
-          </a:effectLst>
-        </p:spPr>
-        <p:txBody>
-          <a:bodyPr wrap="square" lIns="0" tIns="0" rIns="0" bIns="0" rtlCol="0">
-            <a:spAutoFit/>
-          </a:bodyPr>
-          <a:lstStyle/>
-          <a:p>
-            <a:r>
-              <a:rPr lang="en-GB" sz="2500" dirty="0"/>
-              <a:t>EHR. Includes basic info and medical history.</a:t>
-            </a:r>
-          </a:p>
-        </p:txBody>
-      </p:sp>
-      <p:sp>
-        <p:nvSpPr>
-          <p:cNvPr id="19" name="TextBox 18">
-            <a:extLst>
-              <a:ext uri="{FF2B5EF4-FFF2-40B4-BE49-F238E27FC236}">
-                <a16:creationId xmlns:a16="http://schemas.microsoft.com/office/drawing/2014/main" id="{45EBB1B8-239B-473A-954D-290B1E87BA05}"/>
-              </a:ext>
-            </a:extLst>
-          </p:cNvPr>
-          <p:cNvSpPr txBox="1"/>
-          <p:nvPr/>
-        </p:nvSpPr>
-        <p:spPr>
-          <a:xfrm>
-            <a:off x="6818215" y="5329607"/>
-            <a:ext cx="2782985" cy="2015936"/>
-          </a:xfrm>
-          <a:prstGeom prst="rect">
-            <a:avLst/>
-          </a:prstGeom>
-          <a:solidFill>
-            <a:schemeClr val="accent1">
-              <a:lumMod val="20000"/>
-              <a:lumOff val="80000"/>
-              <a:alpha val="47000"/>
-            </a:schemeClr>
-          </a:solidFill>
-          <a:effectLst>
-            <a:softEdge rad="127000"/>
-          </a:effectLst>
-        </p:spPr>
-        <p:txBody>
-          <a:bodyPr wrap="square" rtlCol="0">
-            <a:spAutoFit/>
-          </a:bodyPr>
-          <a:lstStyle/>
-          <a:p>
-            <a:r>
-              <a:rPr lang="en-GB" sz="2500" dirty="0"/>
-              <a:t>Patient/their families may miss things out since they are under stress</a:t>
-            </a:r>
-          </a:p>
-        </p:txBody>
-      </p:sp>
-      <p:pic>
-        <p:nvPicPr>
-          <p:cNvPr id="23" name="Picture 2" descr="See the source image">
-            <a:extLst>
-              <a:ext uri="{FF2B5EF4-FFF2-40B4-BE49-F238E27FC236}">
-                <a16:creationId xmlns:a16="http://schemas.microsoft.com/office/drawing/2014/main" id="{AE385F03-CD68-4C9D-8A25-D6DB3488634D}"/>
-              </a:ext>
-            </a:extLst>
-          </p:cNvPr>
-          <p:cNvPicPr>
-            <a:picLocks noChangeAspect="1" noChangeArrowheads="1"/>
-          </p:cNvPicPr>
-          <p:nvPr/>
-        </p:nvPicPr>
-        <p:blipFill rotWithShape="1">
-          <a:blip r:embed="rId4">
-            <a:extLst>
-              <a:ext uri="{28A0092B-C50C-407E-A947-70E740481C1C}">
-                <a14:useLocalDpi xmlns:a14="http://schemas.microsoft.com/office/drawing/2010/main" val="0"/>
-              </a:ext>
-            </a:extLst>
-          </a:blip>
-          <a:srcRect t="11728" r="82626" b="47499"/>
-          <a:stretch/>
-        </p:blipFill>
-        <p:spPr bwMode="auto">
-          <a:xfrm>
-            <a:off x="4763677" y="5591153"/>
-            <a:ext cx="1934094" cy="3463638"/>
-          </a:xfrm>
-          <a:prstGeom prst="rect">
-            <a:avLst/>
-          </a:prstGeom>
-          <a:noFill/>
-          <a:extLst>
-            <a:ext uri="{909E8E84-426E-40DD-AFC4-6F175D3DCCD1}">
-              <a14:hiddenFill xmlns:a14="http://schemas.microsoft.com/office/drawing/2010/main">
-                <a:solidFill>
-                  <a:srgbClr val="FFFFFF"/>
-                </a:solidFill>
-              </a14:hiddenFill>
-            </a:ext>
-          </a:extLst>
-        </p:spPr>
-      </p:pic>
-      <p:sp>
-        <p:nvSpPr>
-          <p:cNvPr id="25" name="TextBox 24">
-            <a:extLst>
-              <a:ext uri="{FF2B5EF4-FFF2-40B4-BE49-F238E27FC236}">
-                <a16:creationId xmlns:a16="http://schemas.microsoft.com/office/drawing/2014/main" id="{88E75224-B9E4-41AA-B9DE-0AA1E559CFC8}"/>
-              </a:ext>
-            </a:extLst>
-          </p:cNvPr>
-          <p:cNvSpPr txBox="1"/>
-          <p:nvPr/>
-        </p:nvSpPr>
-        <p:spPr>
-          <a:xfrm>
-            <a:off x="4763675" y="3984625"/>
-            <a:ext cx="2923483" cy="1246495"/>
-          </a:xfrm>
-          <a:prstGeom prst="rect">
-            <a:avLst/>
-          </a:prstGeom>
-          <a:solidFill>
-            <a:schemeClr val="accent1">
-              <a:lumMod val="20000"/>
-              <a:lumOff val="80000"/>
-              <a:alpha val="47000"/>
-            </a:schemeClr>
-          </a:solidFill>
-          <a:effectLst>
-            <a:softEdge rad="127000"/>
-          </a:effectLst>
-        </p:spPr>
-        <p:txBody>
-          <a:bodyPr wrap="square">
-            <a:spAutoFit/>
-          </a:bodyPr>
-          <a:lstStyle/>
-          <a:p>
-            <a:r>
-              <a:rPr lang="en-GB" sz="2500" dirty="0"/>
-              <a:t>Backup may be out of date – could mess with medications</a:t>
-            </a:r>
-          </a:p>
-        </p:txBody>
-      </p:sp>
-      <p:sp>
-        <p:nvSpPr>
-          <p:cNvPr id="26" name="TextBox 25">
-            <a:extLst>
-              <a:ext uri="{FF2B5EF4-FFF2-40B4-BE49-F238E27FC236}">
-                <a16:creationId xmlns:a16="http://schemas.microsoft.com/office/drawing/2014/main" id="{F012110B-3012-4EA6-BF67-63C674032359}"/>
-              </a:ext>
-            </a:extLst>
-          </p:cNvPr>
-          <p:cNvSpPr txBox="1"/>
-          <p:nvPr/>
-        </p:nvSpPr>
-        <p:spPr>
-          <a:xfrm>
-            <a:off x="30026" y="7029440"/>
-            <a:ext cx="4638610" cy="2785378"/>
-          </a:xfrm>
-          <a:prstGeom prst="rect">
-            <a:avLst/>
-          </a:prstGeom>
-          <a:solidFill>
-            <a:schemeClr val="tx2">
-              <a:lumMod val="60000"/>
-              <a:lumOff val="40000"/>
-              <a:alpha val="26000"/>
-            </a:schemeClr>
-          </a:solidFill>
-          <a:effectLst>
-            <a:softEdge rad="127000"/>
-          </a:effectLst>
-        </p:spPr>
-        <p:txBody>
-          <a:bodyPr wrap="square" rtlCol="0">
-            <a:spAutoFit/>
-          </a:bodyPr>
-          <a:lstStyle/>
-          <a:p>
-            <a:r>
-              <a:rPr lang="en-GB" sz="2500" dirty="0"/>
-              <a:t>Could be an extra cost. May fail unexpectedly, in which case other patients may also be affected since the remaining machines will have to compensate. Delays may cause health to deteriorate further.</a:t>
-            </a:r>
-          </a:p>
-        </p:txBody>
-      </p:sp>
-      <p:sp>
-        <p:nvSpPr>
-          <p:cNvPr id="27" name="TextBox 26">
-            <a:extLst>
-              <a:ext uri="{FF2B5EF4-FFF2-40B4-BE49-F238E27FC236}">
-                <a16:creationId xmlns:a16="http://schemas.microsoft.com/office/drawing/2014/main" id="{9509D320-BEAB-4C71-A6CB-0238AE53A598}"/>
-              </a:ext>
-            </a:extLst>
-          </p:cNvPr>
-          <p:cNvSpPr txBox="1"/>
-          <p:nvPr/>
-        </p:nvSpPr>
-        <p:spPr>
-          <a:xfrm>
-            <a:off x="7922903" y="6886745"/>
-            <a:ext cx="1856093" cy="307777"/>
-          </a:xfrm>
-          <a:prstGeom prst="rect">
-            <a:avLst/>
-          </a:prstGeom>
-          <a:noFill/>
-        </p:spPr>
-        <p:txBody>
-          <a:bodyPr wrap="square" rtlCol="0">
-            <a:spAutoFit/>
-          </a:bodyPr>
-          <a:lstStyle/>
-          <a:p>
-            <a:r>
-              <a:rPr lang="en-GB" sz="1400" dirty="0"/>
-              <a:t>Source: dzone.com</a:t>
-            </a:r>
-          </a:p>
-        </p:txBody>
-      </p:sp>
-      <p:sp>
-        <p:nvSpPr>
-          <p:cNvPr id="28" name="TextBox 27">
-            <a:extLst>
-              <a:ext uri="{FF2B5EF4-FFF2-40B4-BE49-F238E27FC236}">
-                <a16:creationId xmlns:a16="http://schemas.microsoft.com/office/drawing/2014/main" id="{A55B4056-E3EC-4650-9BF3-724A927DEBBD}"/>
-              </a:ext>
-            </a:extLst>
-          </p:cNvPr>
-          <p:cNvSpPr txBox="1"/>
-          <p:nvPr/>
-        </p:nvSpPr>
-        <p:spPr>
-          <a:xfrm>
-            <a:off x="6735116" y="5005094"/>
-            <a:ext cx="1913241" cy="307777"/>
-          </a:xfrm>
-          <a:prstGeom prst="rect">
-            <a:avLst/>
-          </a:prstGeom>
-          <a:solidFill>
-            <a:schemeClr val="accent1">
-              <a:lumMod val="20000"/>
-              <a:lumOff val="80000"/>
-              <a:alpha val="47000"/>
-            </a:schemeClr>
-          </a:solidFill>
-        </p:spPr>
-        <p:txBody>
-          <a:bodyPr wrap="square" rtlCol="0">
-            <a:spAutoFit/>
-          </a:bodyPr>
-          <a:lstStyle/>
-          <a:p>
-            <a:r>
-              <a:rPr lang="en-GB" sz="1400" dirty="0"/>
-              <a:t>Source: medanets.com</a:t>
-            </a:r>
-          </a:p>
-        </p:txBody>
-      </p:sp>
-      <p:sp>
-        <p:nvSpPr>
-          <p:cNvPr id="29" name="TextBox 28">
-            <a:extLst>
-              <a:ext uri="{FF2B5EF4-FFF2-40B4-BE49-F238E27FC236}">
-                <a16:creationId xmlns:a16="http://schemas.microsoft.com/office/drawing/2014/main" id="{14E336A9-F424-4B7D-9517-2DFD3CD4E335}"/>
-              </a:ext>
-            </a:extLst>
-          </p:cNvPr>
-          <p:cNvSpPr txBox="1"/>
-          <p:nvPr/>
-        </p:nvSpPr>
-        <p:spPr>
-          <a:xfrm>
-            <a:off x="8048493" y="4645216"/>
-            <a:ext cx="1913241" cy="307777"/>
-          </a:xfrm>
-          <a:prstGeom prst="rect">
-            <a:avLst/>
-          </a:prstGeom>
-          <a:noFill/>
-        </p:spPr>
-        <p:txBody>
-          <a:bodyPr wrap="square" rtlCol="0">
-            <a:spAutoFit/>
-          </a:bodyPr>
-          <a:lstStyle/>
-          <a:p>
-            <a:r>
-              <a:rPr lang="en-GB" sz="1400" dirty="0"/>
-              <a:t>Source: abidss.com</a:t>
-            </a:r>
-          </a:p>
-        </p:txBody>
-      </p:sp>
-      <p:sp>
-        <p:nvSpPr>
-          <p:cNvPr id="30" name="TextBox 29">
-            <a:extLst>
-              <a:ext uri="{FF2B5EF4-FFF2-40B4-BE49-F238E27FC236}">
-                <a16:creationId xmlns:a16="http://schemas.microsoft.com/office/drawing/2014/main" id="{42FA0BED-9E82-4DF7-A29C-A71E4FE2146E}"/>
-              </a:ext>
-            </a:extLst>
-          </p:cNvPr>
-          <p:cNvSpPr txBox="1"/>
-          <p:nvPr/>
-        </p:nvSpPr>
-        <p:spPr>
-          <a:xfrm>
-            <a:off x="1278391" y="3333331"/>
-            <a:ext cx="2352915" cy="307777"/>
-          </a:xfrm>
-          <a:prstGeom prst="rect">
-            <a:avLst/>
-          </a:prstGeom>
-          <a:noFill/>
-        </p:spPr>
-        <p:txBody>
-          <a:bodyPr wrap="square" rtlCol="0">
-            <a:spAutoFit/>
-          </a:bodyPr>
-          <a:lstStyle/>
-          <a:p>
-            <a:r>
-              <a:rPr lang="en-GB" sz="1400" dirty="0"/>
-              <a:t>Sources: bing.com, nhs.uk</a:t>
-            </a:r>
-          </a:p>
-        </p:txBody>
-      </p:sp>
-      <p:sp>
-        <p:nvSpPr>
-          <p:cNvPr id="31" name="TextBox 30">
-            <a:extLst>
-              <a:ext uri="{FF2B5EF4-FFF2-40B4-BE49-F238E27FC236}">
-                <a16:creationId xmlns:a16="http://schemas.microsoft.com/office/drawing/2014/main" id="{93B371CB-063A-4333-BED9-A14C887EEDED}"/>
-              </a:ext>
-            </a:extLst>
-          </p:cNvPr>
-          <p:cNvSpPr txBox="1"/>
-          <p:nvPr/>
-        </p:nvSpPr>
-        <p:spPr>
-          <a:xfrm>
-            <a:off x="3375129" y="6777083"/>
-            <a:ext cx="1432402" cy="307777"/>
-          </a:xfrm>
-          <a:prstGeom prst="rect">
-            <a:avLst/>
-          </a:prstGeom>
-          <a:noFill/>
-        </p:spPr>
-        <p:txBody>
-          <a:bodyPr wrap="square" rtlCol="0">
-            <a:spAutoFit/>
-          </a:bodyPr>
-          <a:lstStyle/>
-          <a:p>
-            <a:r>
-              <a:rPr lang="en-GB" sz="1400" dirty="0"/>
-              <a:t>Source: nhs.uk</a:t>
-            </a:r>
-          </a:p>
-        </p:txBody>
-      </p:sp>
-      <p:sp>
-        <p:nvSpPr>
-          <p:cNvPr id="32" name="TextBox 31">
-            <a:extLst>
-              <a:ext uri="{FF2B5EF4-FFF2-40B4-BE49-F238E27FC236}">
-                <a16:creationId xmlns:a16="http://schemas.microsoft.com/office/drawing/2014/main" id="{E3361A04-9AA4-4EE3-AE08-1CBCD81463D9}"/>
-              </a:ext>
-            </a:extLst>
-          </p:cNvPr>
-          <p:cNvSpPr txBox="1"/>
-          <p:nvPr/>
-        </p:nvSpPr>
-        <p:spPr>
-          <a:xfrm>
-            <a:off x="2135507" y="9429385"/>
-            <a:ext cx="2535811" cy="307777"/>
-          </a:xfrm>
-          <a:prstGeom prst="rect">
-            <a:avLst/>
-          </a:prstGeom>
-          <a:noFill/>
-        </p:spPr>
-        <p:txBody>
-          <a:bodyPr wrap="square" rtlCol="0">
-            <a:spAutoFit/>
-          </a:bodyPr>
-          <a:lstStyle/>
-          <a:p>
-            <a:r>
-              <a:rPr lang="en-GB" sz="1400" dirty="0"/>
-              <a:t>Source: technicalprospects.com</a:t>
-            </a:r>
-          </a:p>
-        </p:txBody>
-      </p:sp>
+        </p:nvGrpSpPr>
+        <p:grpSpPr>
+          <a:xfrm>
+            <a:off x="368912" y="6083378"/>
+            <a:ext cx="9232288" cy="6431360"/>
+            <a:chOff x="368912" y="6066671"/>
+            <a:chExt cx="9232288" cy="6431360"/>
+          </a:xfrm>
+        </p:grpSpPr>
+        <p:sp>
+          <p:nvSpPr>
+            <p:cNvPr id="11" name="TextBox 10">
+              <a:extLst>
+                <a:ext uri="{FF2B5EF4-FFF2-40B4-BE49-F238E27FC236}">
+                  <a16:creationId xmlns:a16="http://schemas.microsoft.com/office/drawing/2014/main" id="{9FE23499-90CF-4AAD-937B-03497A3E52FD}"/>
+                </a:ext>
+              </a:extLst>
+            </p:cNvPr>
+            <p:cNvSpPr txBox="1"/>
+            <p:nvPr/>
+          </p:nvSpPr>
+          <p:spPr>
+            <a:xfrm>
+              <a:off x="5497413" y="6066671"/>
+              <a:ext cx="1511082" cy="523220"/>
+            </a:xfrm>
+            <a:prstGeom prst="rect">
+              <a:avLst/>
+            </a:prstGeom>
+            <a:noFill/>
+          </p:spPr>
+          <p:txBody>
+            <a:bodyPr wrap="square" rtlCol="0">
+              <a:spAutoFit/>
+            </a:bodyPr>
+            <a:lstStyle/>
+            <a:p>
+              <a:r>
+                <a:rPr lang="en-GB" sz="2800" b="1" dirty="0"/>
+                <a:t>Security</a:t>
+              </a:r>
+            </a:p>
+          </p:txBody>
+        </p:sp>
+        <p:sp>
+          <p:nvSpPr>
+            <p:cNvPr id="39" name="TextBox 38">
+              <a:extLst>
+                <a:ext uri="{FF2B5EF4-FFF2-40B4-BE49-F238E27FC236}">
+                  <a16:creationId xmlns:a16="http://schemas.microsoft.com/office/drawing/2014/main" id="{A525B0D7-86D9-49FC-A5A0-A31B6FF0E34D}"/>
+                </a:ext>
+              </a:extLst>
+            </p:cNvPr>
+            <p:cNvSpPr txBox="1"/>
+            <p:nvPr/>
+          </p:nvSpPr>
+          <p:spPr>
+            <a:xfrm>
+              <a:off x="5325024" y="6607307"/>
+              <a:ext cx="4276176" cy="2400657"/>
+            </a:xfrm>
+            <a:prstGeom prst="rect">
+              <a:avLst/>
+            </a:prstGeom>
+            <a:solidFill>
+              <a:srgbClr val="E1BDD8">
+                <a:alpha val="46667"/>
+              </a:srgbClr>
+            </a:solidFill>
+            <a:effectLst>
+              <a:softEdge rad="127000"/>
+            </a:effectLst>
+          </p:spPr>
+          <p:txBody>
+            <a:bodyPr wrap="square" rtlCol="0">
+              <a:spAutoFit/>
+            </a:bodyPr>
+            <a:lstStyle/>
+            <a:p>
+              <a:r>
+                <a:rPr lang="en-GB" sz="2500" dirty="0"/>
+                <a:t>If there is any hacking, the patients’ bank information could be left vulnerable to attack. This could also potentially mean the treatment could no longer be afforded.</a:t>
+              </a:r>
+            </a:p>
+          </p:txBody>
+        </p:sp>
+        <p:sp>
+          <p:nvSpPr>
+            <p:cNvPr id="41" name="TextBox 40">
+              <a:extLst>
+                <a:ext uri="{FF2B5EF4-FFF2-40B4-BE49-F238E27FC236}">
+                  <a16:creationId xmlns:a16="http://schemas.microsoft.com/office/drawing/2014/main" id="{FF9B66CA-DBFF-425F-8468-708D0EDF3D33}"/>
+                </a:ext>
+              </a:extLst>
+            </p:cNvPr>
+            <p:cNvSpPr txBox="1"/>
+            <p:nvPr/>
+          </p:nvSpPr>
+          <p:spPr>
+            <a:xfrm>
+              <a:off x="5273841" y="8972001"/>
+              <a:ext cx="4276176" cy="2015936"/>
+            </a:xfrm>
+            <a:prstGeom prst="rect">
+              <a:avLst/>
+            </a:prstGeom>
+            <a:solidFill>
+              <a:srgbClr val="E5EEE0">
+                <a:alpha val="46667"/>
+              </a:srgbClr>
+            </a:solidFill>
+            <a:effectLst>
+              <a:softEdge rad="127000"/>
+            </a:effectLst>
+          </p:spPr>
+          <p:txBody>
+            <a:bodyPr wrap="square" rtlCol="0">
+              <a:spAutoFit/>
+            </a:bodyPr>
+            <a:lstStyle/>
+            <a:p>
+              <a:r>
+                <a:rPr lang="en-GB" sz="2500" dirty="0"/>
+                <a:t>This helps with the environment, as well as increasing convenience. Prescriptions are less likely to be lost.</a:t>
+              </a:r>
+            </a:p>
+          </p:txBody>
+        </p:sp>
+        <p:sp>
+          <p:nvSpPr>
+            <p:cNvPr id="50" name="TextBox 49">
+              <a:extLst>
+                <a:ext uri="{FF2B5EF4-FFF2-40B4-BE49-F238E27FC236}">
+                  <a16:creationId xmlns:a16="http://schemas.microsoft.com/office/drawing/2014/main" id="{AD5AE8B7-1800-4942-8510-72F9188247D0}"/>
+                </a:ext>
+              </a:extLst>
+            </p:cNvPr>
+            <p:cNvSpPr txBox="1"/>
+            <p:nvPr/>
+          </p:nvSpPr>
+          <p:spPr>
+            <a:xfrm>
+              <a:off x="368912" y="10928371"/>
+              <a:ext cx="9181105" cy="1569660"/>
+            </a:xfrm>
+            <a:prstGeom prst="rect">
+              <a:avLst/>
+            </a:prstGeom>
+            <a:solidFill>
+              <a:srgbClr val="E5EEE0">
+                <a:alpha val="46667"/>
+              </a:srgbClr>
+            </a:solidFill>
+            <a:effectLst>
+              <a:softEdge rad="127000"/>
+            </a:effectLst>
+          </p:spPr>
+          <p:txBody>
+            <a:bodyPr wrap="square" rtlCol="0">
+              <a:spAutoFit/>
+            </a:bodyPr>
+            <a:lstStyle/>
+            <a:p>
+              <a:r>
+                <a:rPr lang="en-GB" sz="2400" dirty="0"/>
+                <a:t>However, making prescriptions more accessible leaves them more open to attack, especially on unsecured devices. Additionally, some patients may not often use their phone/be comfortable with technology, so the benefit may be less pronounced when compared with the cost.</a:t>
+              </a:r>
+            </a:p>
+          </p:txBody>
+        </p:sp>
+      </p:grpSp>
     </p:spTree>
+    <p:custDataLst>
+      <p:tags r:id="rId1"/>
+    </p:custDataLst>
     <p:extLst>
       <p:ext uri="{BB962C8B-B14F-4D97-AF65-F5344CB8AC3E}">
-        <p14:creationId xmlns:p14="http://schemas.microsoft.com/office/powerpoint/2010/main" val="1466334232"/>
+        <p14:creationId xmlns:p14="http://schemas.microsoft.com/office/powerpoint/2010/main" val="498523091"/>
       </p:ext>
     </p:extLst>
   </p:cSld>
   <p:clrMapOvr>
     <a:masterClrMapping/>
   </p:clrMapOvr>
+  <p:timing>
+    <p:tnLst>
+      <p:par>
+        <p:cTn id="1" dur="indefinite" restart="never" nodeType="tmRoot">
+          <p:childTnLst>
+            <p:seq concurrent="1" nextAc="seek">
+              <p:cTn id="2" dur="indefinite" nodeType="mainSeq">
+                <p:childTnLst>
+                  <p:par>
+                    <p:cTn id="3" fill="hold">
+                      <p:stCondLst>
+                        <p:cond delay="indefinite"/>
+                      </p:stCondLst>
+                      <p:childTnLst>
+                        <p:par>
+                          <p:cTn id="4" fill="hold">
+                            <p:stCondLst>
+                              <p:cond delay="0"/>
+                            </p:stCondLst>
+                            <p:childTnLst>
+                              <p:par>
+                                <p:cTn id="5" presetID="10" presetClass="entr" presetSubtype="0" fill="hold" nodeType="clickEffect">
+                                  <p:stCondLst>
+                                    <p:cond delay="0"/>
+                                  </p:stCondLst>
+                                  <p:childTnLst>
+                                    <p:set>
+                                      <p:cBhvr>
+                                        <p:cTn id="6" dur="1" fill="hold">
+                                          <p:stCondLst>
+                                            <p:cond delay="0"/>
+                                          </p:stCondLst>
+                                        </p:cTn>
+                                        <p:tgtEl>
+                                          <p:spTgt spid="24"/>
+                                        </p:tgtEl>
+                                        <p:attrNameLst>
+                                          <p:attrName>style.visibility</p:attrName>
+                                        </p:attrNameLst>
+                                      </p:cBhvr>
+                                      <p:to>
+                                        <p:strVal val="visible"/>
+                                      </p:to>
+                                    </p:set>
+                                    <p:animEffect transition="in" filter="fade">
+                                      <p:cBhvr>
+                                        <p:cTn id="7" dur="500"/>
+                                        <p:tgtEl>
+                                          <p:spTgt spid="24"/>
+                                        </p:tgtEl>
+                                      </p:cBhvr>
+                                    </p:animEffect>
+                                  </p:childTnLst>
+                                </p:cTn>
+                              </p:par>
+                            </p:childTnLst>
+                          </p:cTn>
+                        </p:par>
+                      </p:childTnLst>
+                    </p:cTn>
+                  </p:par>
+                  <p:par>
+                    <p:cTn id="8" fill="hold">
+                      <p:stCondLst>
+                        <p:cond delay="indefinite"/>
+                      </p:stCondLst>
+                      <p:childTnLst>
+                        <p:par>
+                          <p:cTn id="9" fill="hold">
+                            <p:stCondLst>
+                              <p:cond delay="0"/>
+                            </p:stCondLst>
+                            <p:childTnLst>
+                              <p:par>
+                                <p:cTn id="10" presetID="10" presetClass="entr" presetSubtype="0" fill="hold" nodeType="clickEffect">
+                                  <p:stCondLst>
+                                    <p:cond delay="0"/>
+                                  </p:stCondLst>
+                                  <p:childTnLst>
+                                    <p:set>
+                                      <p:cBhvr>
+                                        <p:cTn id="11" dur="1" fill="hold">
+                                          <p:stCondLst>
+                                            <p:cond delay="0"/>
+                                          </p:stCondLst>
+                                        </p:cTn>
+                                        <p:tgtEl>
+                                          <p:spTgt spid="20"/>
+                                        </p:tgtEl>
+                                        <p:attrNameLst>
+                                          <p:attrName>style.visibility</p:attrName>
+                                        </p:attrNameLst>
+                                      </p:cBhvr>
+                                      <p:to>
+                                        <p:strVal val="visible"/>
+                                      </p:to>
+                                    </p:set>
+                                    <p:animEffect transition="in" filter="fade">
+                                      <p:cBhvr>
+                                        <p:cTn id="12" dur="500"/>
+                                        <p:tgtEl>
+                                          <p:spTgt spid="20"/>
+                                        </p:tgtEl>
+                                      </p:cBhvr>
+                                    </p:animEffect>
+                                  </p:childTnLst>
+                                </p:cTn>
+                              </p:par>
+                            </p:childTnLst>
+                          </p:cTn>
+                        </p:par>
+                      </p:childTnLst>
+                    </p:cTn>
+                  </p:par>
+                  <p:par>
+                    <p:cTn id="13" fill="hold">
+                      <p:stCondLst>
+                        <p:cond delay="indefinite"/>
+                      </p:stCondLst>
+                      <p:childTnLst>
+                        <p:par>
+                          <p:cTn id="14" fill="hold">
+                            <p:stCondLst>
+                              <p:cond delay="0"/>
+                            </p:stCondLst>
+                            <p:childTnLst>
+                              <p:par>
+                                <p:cTn id="15" presetID="10" presetClass="entr" presetSubtype="0" fill="hold" nodeType="clickEffect">
+                                  <p:stCondLst>
+                                    <p:cond delay="0"/>
+                                  </p:stCondLst>
+                                  <p:childTnLst>
+                                    <p:set>
+                                      <p:cBhvr>
+                                        <p:cTn id="16" dur="1" fill="hold">
+                                          <p:stCondLst>
+                                            <p:cond delay="0"/>
+                                          </p:stCondLst>
+                                        </p:cTn>
+                                        <p:tgtEl>
+                                          <p:spTgt spid="21"/>
+                                        </p:tgtEl>
+                                        <p:attrNameLst>
+                                          <p:attrName>style.visibility</p:attrName>
+                                        </p:attrNameLst>
+                                      </p:cBhvr>
+                                      <p:to>
+                                        <p:strVal val="visible"/>
+                                      </p:to>
+                                    </p:set>
+                                    <p:animEffect transition="in" filter="fade">
+                                      <p:cBhvr>
+                                        <p:cTn id="17" dur="500"/>
+                                        <p:tgtEl>
+                                          <p:spTgt spid="21"/>
+                                        </p:tgtEl>
+                                      </p:cBhvr>
+                                    </p:animEffect>
+                                  </p:childTnLst>
+                                </p:cTn>
+                              </p:par>
+                            </p:childTnLst>
+                          </p:cTn>
+                        </p:par>
+                      </p:childTnLst>
+                    </p:cTn>
+                  </p:par>
+                  <p:par>
+                    <p:cTn id="18" fill="hold">
+                      <p:stCondLst>
+                        <p:cond delay="indefinite"/>
+                      </p:stCondLst>
+                      <p:childTnLst>
+                        <p:par>
+                          <p:cTn id="19" fill="hold">
+                            <p:stCondLst>
+                              <p:cond delay="0"/>
+                            </p:stCondLst>
+                            <p:childTnLst>
+                              <p:par>
+                                <p:cTn id="20" presetID="10" presetClass="entr" presetSubtype="0" fill="hold" nodeType="clickEffect">
+                                  <p:stCondLst>
+                                    <p:cond delay="0"/>
+                                  </p:stCondLst>
+                                  <p:childTnLst>
+                                    <p:set>
+                                      <p:cBhvr>
+                                        <p:cTn id="21" dur="1" fill="hold">
+                                          <p:stCondLst>
+                                            <p:cond delay="0"/>
+                                          </p:stCondLst>
+                                        </p:cTn>
+                                        <p:tgtEl>
+                                          <p:spTgt spid="22"/>
+                                        </p:tgtEl>
+                                        <p:attrNameLst>
+                                          <p:attrName>style.visibility</p:attrName>
+                                        </p:attrNameLst>
+                                      </p:cBhvr>
+                                      <p:to>
+                                        <p:strVal val="visible"/>
+                                      </p:to>
+                                    </p:set>
+                                    <p:animEffect transition="in" filter="fade">
+                                      <p:cBhvr>
+                                        <p:cTn id="22" dur="500"/>
+                                        <p:tgtEl>
+                                          <p:spTgt spid="22"/>
+                                        </p:tgtEl>
+                                      </p:cBhvr>
+                                    </p:animEffect>
+                                  </p:childTnLst>
+                                </p:cTn>
+                              </p:par>
+                            </p:childTnLst>
+                          </p:cTn>
+                        </p:par>
+                      </p:childTnLst>
+                    </p:cTn>
+                  </p:par>
+                </p:childTnLst>
+              </p:cTn>
+              <p:prevCondLst>
+                <p:cond evt="onPrev" delay="0">
+                  <p:tgtEl>
+                    <p:sldTgt/>
+                  </p:tgtEl>
+                </p:cond>
+              </p:prevCondLst>
+              <p:nextCondLst>
+                <p:cond evt="onNext" delay="0">
+                  <p:tgtEl>
+                    <p:sldTgt/>
+                  </p:tgtEl>
+                </p:cond>
+              </p:nextCondLst>
+            </p:seq>
+          </p:childTnLst>
+        </p:cTn>
+      </p:par>
+    </p:tnLst>
+  </p:timing>
 </p:sld>
+</file>
+
+<file path=ppt/tags/tag1.xml><?xml version="1.0" encoding="utf-8"?>
+<p:tagLst xmlns:a="http://schemas.openxmlformats.org/drawingml/2006/main" xmlns:r="http://schemas.openxmlformats.org/officeDocument/2006/relationships" xmlns:p="http://schemas.openxmlformats.org/presentationml/2006/main">
+  <p:tag name="TIMING" val="|3.9"/>
+</p:tagLst>
 </file>
 
 <file path=ppt/theme/theme1.xml><?xml version="1.0" encoding="utf-8"?>
@@ -5694,4 +6441,299 @@
     </a:ext>
   </a:extLst>
 </a:theme>
+</file>
+
+<file path=ppt/theme/theme2.xml><?xml version="1.0" encoding="utf-8"?>
+<a:theme xmlns:a="http://schemas.openxmlformats.org/drawingml/2006/main" name="Office Theme">
+  <a:themeElements>
+    <a:clrScheme name="Office">
+      <a:dk1>
+        <a:sysClr val="windowText" lastClr="000000"/>
+      </a:dk1>
+      <a:lt1>
+        <a:sysClr val="window" lastClr="FFFFFF"/>
+      </a:lt1>
+      <a:dk2>
+        <a:srgbClr val="44546A"/>
+      </a:dk2>
+      <a:lt2>
+        <a:srgbClr val="E7E6E6"/>
+      </a:lt2>
+      <a:accent1>
+        <a:srgbClr val="4472C4"/>
+      </a:accent1>
+      <a:accent2>
+        <a:srgbClr val="ED7D31"/>
+      </a:accent2>
+      <a:accent3>
+        <a:srgbClr val="A5A5A5"/>
+      </a:accent3>
+      <a:accent4>
+        <a:srgbClr val="FFC000"/>
+      </a:accent4>
+      <a:accent5>
+        <a:srgbClr val="5B9BD5"/>
+      </a:accent5>
+      <a:accent6>
+        <a:srgbClr val="70AD47"/>
+      </a:accent6>
+      <a:hlink>
+        <a:srgbClr val="0563C1"/>
+      </a:hlink>
+      <a:folHlink>
+        <a:srgbClr val="954F72"/>
+      </a:folHlink>
+    </a:clrScheme>
+    <a:fontScheme name="Office">
+      <a:majorFont>
+        <a:latin typeface="Calibri Light" panose="020F0302020204030204"/>
+        <a:ea typeface=""/>
+        <a:cs typeface=""/>
+        <a:font script="Jpan" typeface="游ゴシック Light"/>
+        <a:font script="Hang" typeface="맑은 고딕"/>
+        <a:font script="Hans" typeface="等线 Light"/>
+        <a:font script="Hant" typeface="新細明體"/>
+        <a:font script="Arab" typeface="Times New Roman"/>
+        <a:font script="Hebr" typeface="Times New Roman"/>
+        <a:font script="Thai" typeface="Angsana New"/>
+        <a:font script="Ethi" typeface="Nyala"/>
+        <a:font script="Beng" typeface="Vrinda"/>
+        <a:font script="Gujr" typeface="Shruti"/>
+        <a:font script="Khmr" typeface="MoolBoran"/>
+        <a:font script="Knda" typeface="Tunga"/>
+        <a:font script="Guru" typeface="Raavi"/>
+        <a:font script="Cans" typeface="Euphemia"/>
+        <a:font script="Cher" typeface="Plantagenet Cherokee"/>
+        <a:font script="Yiii" typeface="Microsoft Yi Baiti"/>
+        <a:font script="Tibt" typeface="Microsoft Himalaya"/>
+        <a:font script="Thaa" typeface="MV Boli"/>
+        <a:font script="Deva" typeface="Mangal"/>
+        <a:font script="Telu" typeface="Gautami"/>
+        <a:font script="Taml" typeface="Latha"/>
+        <a:font script="Syrc" typeface="Estrangelo Edessa"/>
+        <a:font script="Orya" typeface="Kalinga"/>
+        <a:font script="Mlym" typeface="Kartika"/>
+        <a:font script="Laoo" typeface="DokChampa"/>
+        <a:font script="Sinh" typeface="Iskoola Pota"/>
+        <a:font script="Mong" typeface="Mongolian Baiti"/>
+        <a:font script="Viet" typeface="Times New Roman"/>
+        <a:font script="Uigh" typeface="Microsoft Uighur"/>
+        <a:font script="Geor" typeface="Sylfaen"/>
+        <a:font script="Armn" typeface="Arial"/>
+        <a:font script="Bugi" typeface="Leelawadee UI"/>
+        <a:font script="Bopo" typeface="Microsoft JhengHei"/>
+        <a:font script="Java" typeface="Javanese Text"/>
+        <a:font script="Lisu" typeface="Segoe UI"/>
+        <a:font script="Mymr" typeface="Myanmar Text"/>
+        <a:font script="Nkoo" typeface="Ebrima"/>
+        <a:font script="Olck" typeface="Nirmala UI"/>
+        <a:font script="Osma" typeface="Ebrima"/>
+        <a:font script="Phag" typeface="Phagspa"/>
+        <a:font script="Syrn" typeface="Estrangelo Edessa"/>
+        <a:font script="Syrj" typeface="Estrangelo Edessa"/>
+        <a:font script="Syre" typeface="Estrangelo Edessa"/>
+        <a:font script="Sora" typeface="Nirmala UI"/>
+        <a:font script="Tale" typeface="Microsoft Tai Le"/>
+        <a:font script="Talu" typeface="Microsoft New Tai Lue"/>
+        <a:font script="Tfng" typeface="Ebrima"/>
+      </a:majorFont>
+      <a:minorFont>
+        <a:latin typeface="Calibri" panose="020F0502020204030204"/>
+        <a:ea typeface=""/>
+        <a:cs typeface=""/>
+        <a:font script="Jpan" typeface="游ゴシック"/>
+        <a:font script="Hang" typeface="맑은 고딕"/>
+        <a:font script="Hans" typeface="等线"/>
+        <a:font script="Hant" typeface="新細明體"/>
+        <a:font script="Arab" typeface="Arial"/>
+        <a:font script="Hebr" typeface="Arial"/>
+        <a:font script="Thai" typeface="Cordia New"/>
+        <a:font script="Ethi" typeface="Nyala"/>
+        <a:font script="Beng" typeface="Vrinda"/>
+        <a:font script="Gujr" typeface="Shruti"/>
+        <a:font script="Khmr" typeface="DaunPenh"/>
+        <a:font script="Knda" typeface="Tunga"/>
+        <a:font script="Guru" typeface="Raavi"/>
+        <a:font script="Cans" typeface="Euphemia"/>
+        <a:font script="Cher" typeface="Plantagenet Cherokee"/>
+        <a:font script="Yiii" typeface="Microsoft Yi Baiti"/>
+        <a:font script="Tibt" typeface="Microsoft Himalaya"/>
+        <a:font script="Thaa" typeface="MV Boli"/>
+        <a:font script="Deva" typeface="Mangal"/>
+        <a:font script="Telu" typeface="Gautami"/>
+        <a:font script="Taml" typeface="Latha"/>
+        <a:font script="Syrc" typeface="Estrangelo Edessa"/>
+        <a:font script="Orya" typeface="Kalinga"/>
+        <a:font script="Mlym" typeface="Kartika"/>
+        <a:font script="Laoo" typeface="DokChampa"/>
+        <a:font script="Sinh" typeface="Iskoola Pota"/>
+        <a:font script="Mong" typeface="Mongolian Baiti"/>
+        <a:font script="Viet" typeface="Arial"/>
+        <a:font script="Uigh" typeface="Microsoft Uighur"/>
+        <a:font script="Geor" typeface="Sylfaen"/>
+        <a:font script="Armn" typeface="Arial"/>
+        <a:font script="Bugi" typeface="Leelawadee UI"/>
+        <a:font script="Bopo" typeface="Microsoft JhengHei"/>
+        <a:font script="Java" typeface="Javanese Text"/>
+        <a:font script="Lisu" typeface="Segoe UI"/>
+        <a:font script="Mymr" typeface="Myanmar Text"/>
+        <a:font script="Nkoo" typeface="Ebrima"/>
+        <a:font script="Olck" typeface="Nirmala UI"/>
+        <a:font script="Osma" typeface="Ebrima"/>
+        <a:font script="Phag" typeface="Phagspa"/>
+        <a:font script="Syrn" typeface="Estrangelo Edessa"/>
+        <a:font script="Syrj" typeface="Estrangelo Edessa"/>
+        <a:font script="Syre" typeface="Estrangelo Edessa"/>
+        <a:font script="Sora" typeface="Nirmala UI"/>
+        <a:font script="Tale" typeface="Microsoft Tai Le"/>
+        <a:font script="Talu" typeface="Microsoft New Tai Lue"/>
+        <a:font script="Tfng" typeface="Ebrima"/>
+      </a:minorFont>
+    </a:fontScheme>
+    <a:fmtScheme name="Office">
+      <a:fillStyleLst>
+        <a:solidFill>
+          <a:schemeClr val="phClr"/>
+        </a:solidFill>
+        <a:gradFill rotWithShape="1">
+          <a:gsLst>
+            <a:gs pos="0">
+              <a:schemeClr val="phClr">
+                <a:lumMod val="110000"/>
+                <a:satMod val="105000"/>
+                <a:tint val="67000"/>
+              </a:schemeClr>
+            </a:gs>
+            <a:gs pos="50000">
+              <a:schemeClr val="phClr">
+                <a:lumMod val="105000"/>
+                <a:satMod val="103000"/>
+                <a:tint val="73000"/>
+              </a:schemeClr>
+            </a:gs>
+            <a:gs pos="100000">
+              <a:schemeClr val="phClr">
+                <a:lumMod val="105000"/>
+                <a:satMod val="109000"/>
+                <a:tint val="81000"/>
+              </a:schemeClr>
+            </a:gs>
+          </a:gsLst>
+          <a:lin ang="5400000" scaled="0"/>
+        </a:gradFill>
+        <a:gradFill rotWithShape="1">
+          <a:gsLst>
+            <a:gs pos="0">
+              <a:schemeClr val="phClr">
+                <a:satMod val="103000"/>
+                <a:lumMod val="102000"/>
+                <a:tint val="94000"/>
+              </a:schemeClr>
+            </a:gs>
+            <a:gs pos="50000">
+              <a:schemeClr val="phClr">
+                <a:satMod val="110000"/>
+                <a:lumMod val="100000"/>
+                <a:shade val="100000"/>
+              </a:schemeClr>
+            </a:gs>
+            <a:gs pos="100000">
+              <a:schemeClr val="phClr">
+                <a:lumMod val="99000"/>
+                <a:satMod val="120000"/>
+                <a:shade val="78000"/>
+              </a:schemeClr>
+            </a:gs>
+          </a:gsLst>
+          <a:lin ang="5400000" scaled="0"/>
+        </a:gradFill>
+      </a:fillStyleLst>
+      <a:lnStyleLst>
+        <a:ln w="6350" cap="flat" cmpd="sng" algn="ctr">
+          <a:solidFill>
+            <a:schemeClr val="phClr"/>
+          </a:solidFill>
+          <a:prstDash val="solid"/>
+          <a:miter lim="800000"/>
+        </a:ln>
+        <a:ln w="12700" cap="flat" cmpd="sng" algn="ctr">
+          <a:solidFill>
+            <a:schemeClr val="phClr"/>
+          </a:solidFill>
+          <a:prstDash val="solid"/>
+          <a:miter lim="800000"/>
+        </a:ln>
+        <a:ln w="19050" cap="flat" cmpd="sng" algn="ctr">
+          <a:solidFill>
+            <a:schemeClr val="phClr"/>
+          </a:solidFill>
+          <a:prstDash val="solid"/>
+          <a:miter lim="800000"/>
+        </a:ln>
+      </a:lnStyleLst>
+      <a:effectStyleLst>
+        <a:effectStyle>
+          <a:effectLst/>
+        </a:effectStyle>
+        <a:effectStyle>
+          <a:effectLst/>
+        </a:effectStyle>
+        <a:effectStyle>
+          <a:effectLst>
+            <a:outerShdw blurRad="57150" dist="19050" dir="5400000" algn="ctr" rotWithShape="0">
+              <a:srgbClr val="000000">
+                <a:alpha val="63000"/>
+              </a:srgbClr>
+            </a:outerShdw>
+          </a:effectLst>
+        </a:effectStyle>
+      </a:effectStyleLst>
+      <a:bgFillStyleLst>
+        <a:solidFill>
+          <a:schemeClr val="phClr"/>
+        </a:solidFill>
+        <a:solidFill>
+          <a:schemeClr val="phClr">
+            <a:tint val="95000"/>
+            <a:satMod val="170000"/>
+          </a:schemeClr>
+        </a:solidFill>
+        <a:gradFill rotWithShape="1">
+          <a:gsLst>
+            <a:gs pos="0">
+              <a:schemeClr val="phClr">
+                <a:tint val="93000"/>
+                <a:satMod val="150000"/>
+                <a:shade val="98000"/>
+                <a:lumMod val="102000"/>
+              </a:schemeClr>
+            </a:gs>
+            <a:gs pos="50000">
+              <a:schemeClr val="phClr">
+                <a:tint val="98000"/>
+                <a:satMod val="130000"/>
+                <a:shade val="90000"/>
+                <a:lumMod val="103000"/>
+              </a:schemeClr>
+            </a:gs>
+            <a:gs pos="100000">
+              <a:schemeClr val="phClr">
+                <a:shade val="63000"/>
+                <a:satMod val="120000"/>
+              </a:schemeClr>
+            </a:gs>
+          </a:gsLst>
+          <a:lin ang="5400000" scaled="0"/>
+        </a:gradFill>
+      </a:bgFillStyleLst>
+    </a:fmtScheme>
+  </a:themeElements>
+  <a:objectDefaults/>
+  <a:extraClrSchemeLst/>
+  <a:extLst>
+    <a:ext uri="{05A4C25C-085E-4340-85A3-A5531E510DB2}">
+      <thm15:themeFamily xmlns:thm15="http://schemas.microsoft.com/office/thememl/2012/main" name="Office Theme" id="{62F939B6-93AF-4DB8-9C6B-D6C7DFDC589F}" vid="{4A3C46E8-61CC-4603-A589-7422A47A8E4A}"/>
+    </a:ext>
+  </a:extLst>
+</a:theme>
 </file>
</xml_diff>